<commit_message>
added slides to alignment lecture and fasta/fastq
</commit_message>
<xml_diff>
--- a/assets/lectures/cbw-cshl/2019/mini/RNASeq_MiniLecture_07_FASTA_FASTQ_GTF.pptx
+++ b/assets/lectures/cbw-cshl/2019/mini/RNASeq_MiniLecture_07_FASTA_FASTQ_GTF.pptx
@@ -5,10 +5,14 @@
     <p:sldMasterId id="2147483660" r:id="rId1"/>
   </p:sldMasterIdLst>
   <p:notesMasterIdLst>
-    <p:notesMasterId r:id="rId3"/>
+    <p:notesMasterId r:id="rId7"/>
   </p:notesMasterIdLst>
   <p:sldIdLst>
     <p:sldId id="259" r:id="rId2"/>
+    <p:sldId id="314" r:id="rId3"/>
+    <p:sldId id="262" r:id="rId4"/>
+    <p:sldId id="315" r:id="rId5"/>
+    <p:sldId id="313" r:id="rId6"/>
   </p:sldIdLst>
   <p:sldSz cx="12192000" cy="6858000"/>
   <p:notesSz cx="6858000" cy="9144000"/>
@@ -464,6 +468,129 @@
 </p:notesMaster>
 </file>
 
+<file path=ppt/notesSlides/notesSlide1.xml><?xml version="1.0" encoding="utf-8"?>
+<p:notes xmlns:a="http://schemas.openxmlformats.org/drawingml/2006/main" xmlns:r="http://schemas.openxmlformats.org/officeDocument/2006/relationships" xmlns:p="http://schemas.openxmlformats.org/presentationml/2006/main">
+  <p:cSld>
+    <p:spTree>
+      <p:nvGrpSpPr>
+        <p:cNvPr id="1" name=""/>
+        <p:cNvGrpSpPr/>
+        <p:nvPr/>
+      </p:nvGrpSpPr>
+      <p:grpSpPr>
+        <a:xfrm>
+          <a:off x="0" y="0"/>
+          <a:ext cx="0" cy="0"/>
+          <a:chOff x="0" y="0"/>
+          <a:chExt cx="0" cy="0"/>
+        </a:xfrm>
+      </p:grpSpPr>
+      <p:sp>
+        <p:nvSpPr>
+          <p:cNvPr id="2" name="Slide Image Placeholder 1"/>
+          <p:cNvSpPr>
+            <a:spLocks noGrp="1" noRot="1" noChangeAspect="1"/>
+          </p:cNvSpPr>
+          <p:nvPr>
+            <p:ph type="sldImg"/>
+          </p:nvPr>
+        </p:nvSpPr>
+        <p:spPr/>
+      </p:sp>
+      <p:sp>
+        <p:nvSpPr>
+          <p:cNvPr id="3" name="Notes Placeholder 2"/>
+          <p:cNvSpPr>
+            <a:spLocks noGrp="1"/>
+          </p:cNvSpPr>
+          <p:nvPr>
+            <p:ph type="body" idx="1"/>
+          </p:nvPr>
+        </p:nvSpPr>
+        <p:spPr/>
+        <p:txBody>
+          <a:bodyPr/>
+          <a:lstStyle/>
+          <a:p>
+            <a:r>
+              <a:rPr lang="en-US" dirty="0"/>
+              <a:t>http://</a:t>
+            </a:r>
+            <a:r>
+              <a:rPr lang="en-US" dirty="0" err="1"/>
+              <a:t>www.somewhereville.com</a:t>
+            </a:r>
+            <a:r>
+              <a:rPr lang="en-US" dirty="0"/>
+              <a:t>/2011/12/16/sanger-and-illumina-1-3-and-solexa-phred-score-q-ascii-glyph-base-error-conversion-tables/</a:t>
+            </a:r>
+          </a:p>
+          <a:p>
+            <a:endParaRPr lang="en-US" dirty="0"/>
+          </a:p>
+          <a:p>
+            <a:r>
+              <a:rPr lang="en-US" dirty="0"/>
+              <a:t>https://</a:t>
+            </a:r>
+            <a:r>
+              <a:rPr lang="en-US" dirty="0" err="1"/>
+              <a:t>en.wikipedia.org</a:t>
+            </a:r>
+            <a:r>
+              <a:rPr lang="en-US" dirty="0"/>
+              <a:t>/wiki/</a:t>
+            </a:r>
+            <a:r>
+              <a:rPr lang="en-US" dirty="0" err="1"/>
+              <a:t>FASTQ_format#Quality</a:t>
+            </a:r>
+            <a:endParaRPr lang="en-US" dirty="0"/>
+          </a:p>
+          <a:p>
+            <a:endParaRPr lang="en-US" dirty="0"/>
+          </a:p>
+          <a:p>
+            <a:endParaRPr lang="en-US" dirty="0"/>
+          </a:p>
+        </p:txBody>
+      </p:sp>
+      <p:sp>
+        <p:nvSpPr>
+          <p:cNvPr id="4" name="Slide Number Placeholder 3"/>
+          <p:cNvSpPr>
+            <a:spLocks noGrp="1"/>
+          </p:cNvSpPr>
+          <p:nvPr>
+            <p:ph type="sldNum" sz="quarter" idx="10"/>
+          </p:nvPr>
+        </p:nvSpPr>
+        <p:spPr/>
+        <p:txBody>
+          <a:bodyPr/>
+          <a:lstStyle/>
+          <a:p>
+            <a:fld id="{099D50AF-F628-504F-B99D-05BB4C0BF79D}" type="slidenum">
+              <a:rPr lang="en-US" smtClean="0"/>
+              <a:t>5</a:t>
+            </a:fld>
+            <a:endParaRPr lang="en-US"/>
+          </a:p>
+        </p:txBody>
+      </p:sp>
+    </p:spTree>
+    <p:extLst>
+      <p:ext uri="{BB962C8B-B14F-4D97-AF65-F5344CB8AC3E}">
+        <p14:creationId xmlns:p14="http://schemas.microsoft.com/office/powerpoint/2010/main" val="378807193"/>
+      </p:ext>
+    </p:extLst>
+  </p:cSld>
+  <p:clrMapOvr>
+    <a:masterClrMapping/>
+  </p:clrMapOvr>
+</p:notes>
+</file>
+
 <file path=ppt/slideLayouts/slideLayout1.xml><?xml version="1.0" encoding="utf-8"?>
 <p:sldLayout xmlns:a="http://schemas.openxmlformats.org/drawingml/2006/main" xmlns:r="http://schemas.openxmlformats.org/officeDocument/2006/relationships" xmlns:p="http://schemas.openxmlformats.org/presentationml/2006/main" type="title" preserve="1">
   <p:cSld name="Title Slide">
@@ -718,14 +845,14 @@
           </a:ln>
           <a:extLst>
             <a:ext uri="{909E8E84-426E-40dd-AFC4-6F175D3DCCD1}">
-              <a14:hiddenFill xmlns="" xmlns:a14="http://schemas.microsoft.com/office/drawing/2010/main">
+              <a14:hiddenFill xmlns:a14="http://schemas.microsoft.com/office/drawing/2010/main" xmlns="">
                 <a:solidFill>
                   <a:srgbClr val="FFFFFF"/>
                 </a:solidFill>
               </a14:hiddenFill>
             </a:ext>
             <a:ext uri="{91240B29-F687-4f45-9708-019B960494DF}">
-              <a14:hiddenLine xmlns="" xmlns:a14="http://schemas.microsoft.com/office/drawing/2010/main" w="9525">
+              <a14:hiddenLine xmlns:a14="http://schemas.microsoft.com/office/drawing/2010/main" xmlns="" w="9525">
                 <a:solidFill>
                   <a:srgbClr val="000000"/>
                 </a:solidFill>
@@ -3481,14 +3608,14 @@
           </a:ln>
           <a:extLst>
             <a:ext uri="{909E8E84-426E-40dd-AFC4-6F175D3DCCD1}">
-              <a14:hiddenFill xmlns="" xmlns:a14="http://schemas.microsoft.com/office/drawing/2010/main">
+              <a14:hiddenFill xmlns:a14="http://schemas.microsoft.com/office/drawing/2010/main" xmlns="">
                 <a:solidFill>
                   <a:srgbClr val="FFFFFF"/>
                 </a:solidFill>
               </a14:hiddenFill>
             </a:ext>
             <a:ext uri="{91240B29-F687-4f45-9708-019B960494DF}">
-              <a14:hiddenLine xmlns="" xmlns:a14="http://schemas.microsoft.com/office/drawing/2010/main" w="9525">
+              <a14:hiddenLine xmlns:a14="http://schemas.microsoft.com/office/drawing/2010/main" xmlns="" w="9525">
                 <a:solidFill>
                   <a:srgbClr val="000000"/>
                 </a:solidFill>
@@ -4375,14 +4502,14 @@
           </a:ln>
           <a:extLst>
             <a:ext uri="{909E8E84-426E-40dd-AFC4-6F175D3DCCD1}">
-              <a14:hiddenFill xmlns="" xmlns:a14="http://schemas.microsoft.com/office/drawing/2010/main">
+              <a14:hiddenFill xmlns:a14="http://schemas.microsoft.com/office/drawing/2010/main" xmlns="">
                 <a:solidFill>
                   <a:srgbClr val="FFFFFF"/>
                 </a:solidFill>
               </a14:hiddenFill>
             </a:ext>
             <a:ext uri="{91240B29-F687-4f45-9708-019B960494DF}">
-              <a14:hiddenLine xmlns="" xmlns:a14="http://schemas.microsoft.com/office/drawing/2010/main" w="9525">
+              <a14:hiddenLine xmlns:a14="http://schemas.microsoft.com/office/drawing/2010/main" xmlns="" w="9525">
                 <a:solidFill>
                   <a:srgbClr val="000000"/>
                 </a:solidFill>
@@ -4398,6 +4525,2275 @@
     <p:extLst>
       <p:ext uri="{BB962C8B-B14F-4D97-AF65-F5344CB8AC3E}">
         <p14:creationId xmlns:p14="http://schemas.microsoft.com/office/powerpoint/2010/main" val="1702947648"/>
+      </p:ext>
+    </p:extLst>
+  </p:cSld>
+  <p:clrMapOvr>
+    <a:masterClrMapping/>
+  </p:clrMapOvr>
+</p:sld>
+</file>
+
+<file path=ppt/slides/slide2.xml><?xml version="1.0" encoding="utf-8"?>
+<p:sld xmlns:a="http://schemas.openxmlformats.org/drawingml/2006/main" xmlns:r="http://schemas.openxmlformats.org/officeDocument/2006/relationships" xmlns:p="http://schemas.openxmlformats.org/presentationml/2006/main">
+  <p:cSld>
+    <p:spTree>
+      <p:nvGrpSpPr>
+        <p:cNvPr id="1" name=""/>
+        <p:cNvGrpSpPr/>
+        <p:nvPr/>
+      </p:nvGrpSpPr>
+      <p:grpSpPr>
+        <a:xfrm>
+          <a:off x="0" y="0"/>
+          <a:ext cx="0" cy="0"/>
+          <a:chOff x="0" y="0"/>
+          <a:chExt cx="0" cy="0"/>
+        </a:xfrm>
+      </p:grpSpPr>
+      <p:sp>
+        <p:nvSpPr>
+          <p:cNvPr id="2" name="Title 1">
+            <a:extLst>
+              <a:ext uri="{FF2B5EF4-FFF2-40B4-BE49-F238E27FC236}">
+                <a16:creationId xmlns:a16="http://schemas.microsoft.com/office/drawing/2014/main" id="{AB3AF11C-02B0-E048-AC0A-A234EFF9D791}"/>
+              </a:ext>
+            </a:extLst>
+          </p:cNvPr>
+          <p:cNvSpPr>
+            <a:spLocks noGrp="1"/>
+          </p:cNvSpPr>
+          <p:nvPr>
+            <p:ph type="title"/>
+          </p:nvPr>
+        </p:nvSpPr>
+        <p:spPr>
+          <a:xfrm>
+            <a:off x="294290" y="18256"/>
+            <a:ext cx="11750564" cy="1169414"/>
+          </a:xfrm>
+        </p:spPr>
+        <p:txBody>
+          <a:bodyPr>
+            <a:normAutofit/>
+          </a:bodyPr>
+          <a:lstStyle/>
+          <a:p>
+            <a:r>
+              <a:rPr lang="en-US" sz="3600" b="1" dirty="0" err="1">
+                <a:latin typeface="Calibri" panose="020F0502020204030204" pitchFamily="34" charset="0"/>
+                <a:cs typeface="Calibri" panose="020F0502020204030204" pitchFamily="34" charset="0"/>
+              </a:rPr>
+              <a:t>Fasta</a:t>
+            </a:r>
+            <a:r>
+              <a:rPr lang="en-US" sz="3600" b="1" dirty="0">
+                <a:latin typeface="Calibri" panose="020F0502020204030204" pitchFamily="34" charset="0"/>
+                <a:cs typeface="Calibri" panose="020F0502020204030204" pitchFamily="34" charset="0"/>
+              </a:rPr>
+              <a:t> – format for representing nucleic acid or amino acid sequences</a:t>
+            </a:r>
+          </a:p>
+        </p:txBody>
+      </p:sp>
+      <p:sp>
+        <p:nvSpPr>
+          <p:cNvPr id="3" name="Content Placeholder 2">
+            <a:extLst>
+              <a:ext uri="{FF2B5EF4-FFF2-40B4-BE49-F238E27FC236}">
+                <a16:creationId xmlns:a16="http://schemas.microsoft.com/office/drawing/2014/main" id="{F0F34C72-5D74-D949-9DB5-32190B978970}"/>
+              </a:ext>
+            </a:extLst>
+          </p:cNvPr>
+          <p:cNvSpPr>
+            <a:spLocks noGrp="1"/>
+          </p:cNvSpPr>
+          <p:nvPr>
+            <p:ph idx="1"/>
+          </p:nvPr>
+        </p:nvSpPr>
+        <p:spPr>
+          <a:xfrm>
+            <a:off x="538152" y="1376972"/>
+            <a:ext cx="7170683" cy="4966678"/>
+          </a:xfrm>
+        </p:spPr>
+        <p:txBody>
+          <a:bodyPr>
+            <a:normAutofit/>
+          </a:bodyPr>
+          <a:lstStyle/>
+          <a:p>
+            <a:pPr marL="0" indent="0">
+              <a:buNone/>
+            </a:pPr>
+            <a:r>
+              <a:rPr lang="en-US" sz="1400" dirty="0">
+                <a:latin typeface="Calibri" panose="020F0502020204030204" pitchFamily="34" charset="0"/>
+                <a:cs typeface="Calibri" panose="020F0502020204030204" pitchFamily="34" charset="0"/>
+              </a:rPr>
+              <a:t>&gt;AY274119.3 Severe acute respiratory syndrome-related coronavirus isolate Tor2, complete genome</a:t>
+            </a:r>
+          </a:p>
+          <a:p>
+            <a:pPr marL="0" indent="0">
+              <a:buNone/>
+            </a:pPr>
+            <a:endParaRPr lang="en-US" sz="1400" dirty="0">
+              <a:latin typeface="Calibri" panose="020F0502020204030204" pitchFamily="34" charset="0"/>
+              <a:cs typeface="Calibri" panose="020F0502020204030204" pitchFamily="34" charset="0"/>
+            </a:endParaRPr>
+          </a:p>
+          <a:p>
+            <a:pPr marL="0" indent="0">
+              <a:buNone/>
+            </a:pPr>
+            <a:r>
+              <a:rPr lang="en-US" sz="1400" dirty="0">
+                <a:latin typeface="Calibri" panose="020F0502020204030204" pitchFamily="34" charset="0"/>
+                <a:cs typeface="Calibri" panose="020F0502020204030204" pitchFamily="34" charset="0"/>
+              </a:rPr>
+              <a:t>ATATTAGGTTTTTACCTACCCAGGAAAAGCCAACCAACCTCGATCTCTTGTAGATCTGTTCTCTAAACGA</a:t>
+            </a:r>
+          </a:p>
+          <a:p>
+            <a:pPr marL="0" indent="0">
+              <a:buNone/>
+            </a:pPr>
+            <a:r>
+              <a:rPr lang="en-US" sz="1400" dirty="0">
+                <a:latin typeface="Calibri" panose="020F0502020204030204" pitchFamily="34" charset="0"/>
+                <a:cs typeface="Calibri" panose="020F0502020204030204" pitchFamily="34" charset="0"/>
+              </a:rPr>
+              <a:t>ACTTTAAAATCTGTGTAGCTGTCGCTCGGCTGCATGCCTAGTGCACCTACGCAGTATAAACAATAATAAA</a:t>
+            </a:r>
+          </a:p>
+          <a:p>
+            <a:pPr marL="0" indent="0">
+              <a:buNone/>
+            </a:pPr>
+            <a:r>
+              <a:rPr lang="en-US" sz="1400" dirty="0">
+                <a:latin typeface="Calibri" panose="020F0502020204030204" pitchFamily="34" charset="0"/>
+                <a:cs typeface="Calibri" panose="020F0502020204030204" pitchFamily="34" charset="0"/>
+              </a:rPr>
+              <a:t>TTTTACTGTCGTTGACAAGAAACGAGTAACTCGTCCCTCTTCTGCAGACTGCTTACGGTTTCGTCCGTGT</a:t>
+            </a:r>
+          </a:p>
+          <a:p>
+            <a:pPr marL="0" indent="0">
+              <a:buNone/>
+            </a:pPr>
+            <a:r>
+              <a:rPr lang="en-US" sz="1400" dirty="0">
+                <a:latin typeface="Calibri" panose="020F0502020204030204" pitchFamily="34" charset="0"/>
+                <a:cs typeface="Calibri" panose="020F0502020204030204" pitchFamily="34" charset="0"/>
+              </a:rPr>
+              <a:t>TGCAGTCGATCATCAGCATACCTAGGTTTCGTCCGGGTGTGACCGAAAGGTAAGATGGAGAGCCTTGTTC</a:t>
+            </a:r>
+          </a:p>
+          <a:p>
+            <a:pPr marL="0" indent="0">
+              <a:buNone/>
+            </a:pPr>
+            <a:r>
+              <a:rPr lang="en-US" sz="1400" dirty="0">
+                <a:latin typeface="Calibri" panose="020F0502020204030204" pitchFamily="34" charset="0"/>
+                <a:cs typeface="Calibri" panose="020F0502020204030204" pitchFamily="34" charset="0"/>
+              </a:rPr>
+              <a:t>TTGGTGTCAACGAGAAAACACACGTCCAACTCAGTTTGCCTGTCCTTCAGGTTAGAGACGTGCTAGTGCG</a:t>
+            </a:r>
+          </a:p>
+          <a:p>
+            <a:pPr marL="0" indent="0">
+              <a:buNone/>
+            </a:pPr>
+            <a:r>
+              <a:rPr lang="en-US" sz="1400" dirty="0">
+                <a:latin typeface="Calibri" panose="020F0502020204030204" pitchFamily="34" charset="0"/>
+                <a:cs typeface="Calibri" panose="020F0502020204030204" pitchFamily="34" charset="0"/>
+              </a:rPr>
+              <a:t>TGGCTTCGGGGACTCTGTGGAAGAGGCCCTATCGGAGGCACGTGAACACCTCAAAAATGGCACTTGTGGT</a:t>
+            </a:r>
+          </a:p>
+          <a:p>
+            <a:pPr marL="0" indent="0">
+              <a:buNone/>
+            </a:pPr>
+            <a:r>
+              <a:rPr lang="en-US" sz="1400" dirty="0">
+                <a:latin typeface="Calibri" panose="020F0502020204030204" pitchFamily="34" charset="0"/>
+                <a:cs typeface="Calibri" panose="020F0502020204030204" pitchFamily="34" charset="0"/>
+              </a:rPr>
+              <a:t>…</a:t>
+            </a:r>
+          </a:p>
+          <a:p>
+            <a:pPr marL="0" indent="0">
+              <a:buNone/>
+            </a:pPr>
+            <a:endParaRPr lang="en-US" sz="1400" dirty="0">
+              <a:latin typeface="Calibri" panose="020F0502020204030204" pitchFamily="34" charset="0"/>
+              <a:cs typeface="Calibri" panose="020F0502020204030204" pitchFamily="34" charset="0"/>
+            </a:endParaRPr>
+          </a:p>
+          <a:p>
+            <a:pPr marL="0" indent="0">
+              <a:buNone/>
+            </a:pPr>
+            <a:r>
+              <a:rPr lang="en-US" sz="1400" dirty="0">
+                <a:latin typeface="Calibri" panose="020F0502020204030204" pitchFamily="34" charset="0"/>
+                <a:cs typeface="Calibri" panose="020F0502020204030204" pitchFamily="34" charset="0"/>
+              </a:rPr>
+              <a:t>&gt;FJ882960.1 SARS coronavirus ExoN1 isolate P3pp34, complete genome</a:t>
+            </a:r>
+          </a:p>
+          <a:p>
+            <a:pPr marL="0" indent="0">
+              <a:buNone/>
+            </a:pPr>
+            <a:r>
+              <a:rPr lang="en-US" sz="1400" dirty="0">
+                <a:latin typeface="Calibri" panose="020F0502020204030204" pitchFamily="34" charset="0"/>
+                <a:cs typeface="Calibri" panose="020F0502020204030204" pitchFamily="34" charset="0"/>
+              </a:rPr>
+              <a:t>CGATCTCTTGTAGATCTGTTCTCTAAACGAACTTTAAAATCTGTGTAGCTGTCGCTCGGCTGCATGCCTA</a:t>
+            </a:r>
+          </a:p>
+          <a:p>
+            <a:pPr marL="0" indent="0">
+              <a:buNone/>
+            </a:pPr>
+            <a:r>
+              <a:rPr lang="en-US" sz="1400" dirty="0">
+                <a:latin typeface="Calibri" panose="020F0502020204030204" pitchFamily="34" charset="0"/>
+                <a:cs typeface="Calibri" panose="020F0502020204030204" pitchFamily="34" charset="0"/>
+              </a:rPr>
+              <a:t>GTGCACCTACGCAGTATAAACAATAATAAATTTTACTGTCGTTGACAAGAAACGAGTAACTCGTCCCTCT</a:t>
+            </a:r>
+          </a:p>
+          <a:p>
+            <a:pPr marL="0" indent="0">
+              <a:buNone/>
+            </a:pPr>
+            <a:r>
+              <a:rPr lang="en-US" sz="1400" dirty="0">
+                <a:latin typeface="Calibri" panose="020F0502020204030204" pitchFamily="34" charset="0"/>
+                <a:cs typeface="Calibri" panose="020F0502020204030204" pitchFamily="34" charset="0"/>
+              </a:rPr>
+              <a:t>TCTGCAGACTGCTTACGGTTTCGTCCGTGTTGCAGTCGATCATCAGCATACCTAGGTTTCGTCCGGGTGT</a:t>
+            </a:r>
+          </a:p>
+          <a:p>
+            <a:pPr marL="0" indent="0">
+              <a:buNone/>
+            </a:pPr>
+            <a:r>
+              <a:rPr lang="en-US" sz="1400" dirty="0">
+                <a:latin typeface="Calibri" panose="020F0502020204030204" pitchFamily="34" charset="0"/>
+                <a:cs typeface="Calibri" panose="020F0502020204030204" pitchFamily="34" charset="0"/>
+              </a:rPr>
+              <a:t>…</a:t>
+            </a:r>
+          </a:p>
+        </p:txBody>
+      </p:sp>
+      <p:sp>
+        <p:nvSpPr>
+          <p:cNvPr id="4" name="TextBox 3">
+            <a:extLst>
+              <a:ext uri="{FF2B5EF4-FFF2-40B4-BE49-F238E27FC236}">
+                <a16:creationId xmlns:a16="http://schemas.microsoft.com/office/drawing/2014/main" id="{276B2D58-E33B-3F49-8887-F790D29E79A6}"/>
+              </a:ext>
+            </a:extLst>
+          </p:cNvPr>
+          <p:cNvSpPr txBox="1"/>
+          <p:nvPr/>
+        </p:nvSpPr>
+        <p:spPr>
+          <a:xfrm>
+            <a:off x="8080323" y="934058"/>
+            <a:ext cx="3815255" cy="1200329"/>
+          </a:xfrm>
+          <a:prstGeom prst="rect">
+            <a:avLst/>
+          </a:prstGeom>
+          <a:noFill/>
+        </p:spPr>
+        <p:txBody>
+          <a:bodyPr wrap="square" rtlCol="0">
+            <a:spAutoFit/>
+          </a:bodyPr>
+          <a:lstStyle/>
+          <a:p>
+            <a:r>
+              <a:rPr lang="en-US" dirty="0">
+                <a:latin typeface="Calibri" panose="020F0502020204030204" pitchFamily="34" charset="0"/>
+                <a:cs typeface="Calibri" panose="020F0502020204030204" pitchFamily="34" charset="0"/>
+              </a:rPr>
+              <a:t>First line starts with “&gt;” header or ”Comment”; used as a summary/description, often starting with unique accession/identifier</a:t>
+            </a:r>
+          </a:p>
+        </p:txBody>
+      </p:sp>
+      <p:cxnSp>
+        <p:nvCxnSpPr>
+          <p:cNvPr id="6" name="Straight Connector 5">
+            <a:extLst>
+              <a:ext uri="{FF2B5EF4-FFF2-40B4-BE49-F238E27FC236}">
+                <a16:creationId xmlns:a16="http://schemas.microsoft.com/office/drawing/2014/main" id="{AC9AF0E9-54F8-734B-963A-E3CE46BD4DFA}"/>
+              </a:ext>
+            </a:extLst>
+          </p:cNvPr>
+          <p:cNvCxnSpPr/>
+          <p:nvPr/>
+        </p:nvCxnSpPr>
+        <p:spPr>
+          <a:xfrm>
+            <a:off x="7934001" y="1343845"/>
+            <a:ext cx="0" cy="367862"/>
+          </a:xfrm>
+          <a:prstGeom prst="line">
+            <a:avLst/>
+          </a:prstGeom>
+          <a:ln w="50800">
+            <a:solidFill>
+              <a:srgbClr val="FF0000"/>
+            </a:solidFill>
+          </a:ln>
+        </p:spPr>
+        <p:style>
+          <a:lnRef idx="1">
+            <a:schemeClr val="accent1"/>
+          </a:lnRef>
+          <a:fillRef idx="0">
+            <a:schemeClr val="accent1"/>
+          </a:fillRef>
+          <a:effectRef idx="0">
+            <a:schemeClr val="accent1"/>
+          </a:effectRef>
+          <a:fontRef idx="minor">
+            <a:schemeClr val="tx1"/>
+          </a:fontRef>
+        </p:style>
+      </p:cxnSp>
+      <p:cxnSp>
+        <p:nvCxnSpPr>
+          <p:cNvPr id="7" name="Straight Connector 6">
+            <a:extLst>
+              <a:ext uri="{FF2B5EF4-FFF2-40B4-BE49-F238E27FC236}">
+                <a16:creationId xmlns:a16="http://schemas.microsoft.com/office/drawing/2014/main" id="{7ECF239F-F843-744A-AB66-83AE2EE0799F}"/>
+              </a:ext>
+            </a:extLst>
+          </p:cNvPr>
+          <p:cNvCxnSpPr>
+            <a:cxnSpLocks/>
+          </p:cNvCxnSpPr>
+          <p:nvPr/>
+        </p:nvCxnSpPr>
+        <p:spPr>
+          <a:xfrm>
+            <a:off x="7934001" y="2228855"/>
+            <a:ext cx="0" cy="1957388"/>
+          </a:xfrm>
+          <a:prstGeom prst="line">
+            <a:avLst/>
+          </a:prstGeom>
+          <a:ln w="50800">
+            <a:solidFill>
+              <a:srgbClr val="FF0000"/>
+            </a:solidFill>
+          </a:ln>
+        </p:spPr>
+        <p:style>
+          <a:lnRef idx="1">
+            <a:schemeClr val="accent1"/>
+          </a:lnRef>
+          <a:fillRef idx="0">
+            <a:schemeClr val="accent1"/>
+          </a:fillRef>
+          <a:effectRef idx="0">
+            <a:schemeClr val="accent1"/>
+          </a:effectRef>
+          <a:fontRef idx="minor">
+            <a:schemeClr val="tx1"/>
+          </a:fontRef>
+        </p:style>
+      </p:cxnSp>
+      <p:sp>
+        <p:nvSpPr>
+          <p:cNvPr id="10" name="TextBox 9">
+            <a:extLst>
+              <a:ext uri="{FF2B5EF4-FFF2-40B4-BE49-F238E27FC236}">
+                <a16:creationId xmlns:a16="http://schemas.microsoft.com/office/drawing/2014/main" id="{8C585702-0D1B-834A-8781-6EFB02C7F419}"/>
+              </a:ext>
+            </a:extLst>
+          </p:cNvPr>
+          <p:cNvSpPr txBox="1"/>
+          <p:nvPr/>
+        </p:nvSpPr>
+        <p:spPr>
+          <a:xfrm>
+            <a:off x="8080322" y="2340303"/>
+            <a:ext cx="3815255" cy="1754326"/>
+          </a:xfrm>
+          <a:prstGeom prst="rect">
+            <a:avLst/>
+          </a:prstGeom>
+          <a:noFill/>
+        </p:spPr>
+        <p:txBody>
+          <a:bodyPr wrap="square" rtlCol="0">
+            <a:spAutoFit/>
+          </a:bodyPr>
+          <a:lstStyle/>
+          <a:p>
+            <a:r>
+              <a:rPr lang="en-US" dirty="0">
+                <a:latin typeface="Calibri" panose="020F0502020204030204" pitchFamily="34" charset="0"/>
+                <a:cs typeface="Calibri" panose="020F0502020204030204" pitchFamily="34" charset="0"/>
+              </a:rPr>
+              <a:t>Subsequent lines contain sequence</a:t>
+            </a:r>
+          </a:p>
+          <a:p>
+            <a:pPr marL="285750" indent="-285750">
+              <a:buFontTx/>
+              <a:buChar char="-"/>
+            </a:pPr>
+            <a:r>
+              <a:rPr lang="en-US" dirty="0">
+                <a:latin typeface="Calibri" panose="020F0502020204030204" pitchFamily="34" charset="0"/>
+                <a:cs typeface="Calibri" panose="020F0502020204030204" pitchFamily="34" charset="0"/>
+              </a:rPr>
+              <a:t>Interleaved: sequence broken into multiple lines of 70/80/120 characters</a:t>
+            </a:r>
+          </a:p>
+          <a:p>
+            <a:pPr marL="285750" indent="-285750">
+              <a:buFontTx/>
+              <a:buChar char="-"/>
+            </a:pPr>
+            <a:r>
+              <a:rPr lang="en-US" dirty="0">
+                <a:latin typeface="Calibri" panose="020F0502020204030204" pitchFamily="34" charset="0"/>
+                <a:cs typeface="Calibri" panose="020F0502020204030204" pitchFamily="34" charset="0"/>
+              </a:rPr>
+              <a:t>Sequential: entire sequence on a single line</a:t>
+            </a:r>
+          </a:p>
+        </p:txBody>
+      </p:sp>
+      <p:cxnSp>
+        <p:nvCxnSpPr>
+          <p:cNvPr id="11" name="Straight Connector 10">
+            <a:extLst>
+              <a:ext uri="{FF2B5EF4-FFF2-40B4-BE49-F238E27FC236}">
+                <a16:creationId xmlns:a16="http://schemas.microsoft.com/office/drawing/2014/main" id="{22033CE3-0238-7D4A-9DEE-ECC6E3457FB3}"/>
+              </a:ext>
+            </a:extLst>
+          </p:cNvPr>
+          <p:cNvCxnSpPr>
+            <a:cxnSpLocks/>
+          </p:cNvCxnSpPr>
+          <p:nvPr/>
+        </p:nvCxnSpPr>
+        <p:spPr>
+          <a:xfrm flipH="1">
+            <a:off x="7933677" y="4886325"/>
+            <a:ext cx="324" cy="1014413"/>
+          </a:xfrm>
+          <a:prstGeom prst="line">
+            <a:avLst/>
+          </a:prstGeom>
+          <a:ln w="50800">
+            <a:solidFill>
+              <a:srgbClr val="FF0000"/>
+            </a:solidFill>
+          </a:ln>
+        </p:spPr>
+        <p:style>
+          <a:lnRef idx="1">
+            <a:schemeClr val="accent1"/>
+          </a:lnRef>
+          <a:fillRef idx="0">
+            <a:schemeClr val="accent1"/>
+          </a:fillRef>
+          <a:effectRef idx="0">
+            <a:schemeClr val="accent1"/>
+          </a:effectRef>
+          <a:fontRef idx="minor">
+            <a:schemeClr val="tx1"/>
+          </a:fontRef>
+        </p:style>
+      </p:cxnSp>
+      <p:sp>
+        <p:nvSpPr>
+          <p:cNvPr id="14" name="TextBox 13">
+            <a:extLst>
+              <a:ext uri="{FF2B5EF4-FFF2-40B4-BE49-F238E27FC236}">
+                <a16:creationId xmlns:a16="http://schemas.microsoft.com/office/drawing/2014/main" id="{052D6C74-88A2-D54B-9A91-D730A6B9FC93}"/>
+              </a:ext>
+            </a:extLst>
+          </p:cNvPr>
+          <p:cNvSpPr txBox="1"/>
+          <p:nvPr/>
+        </p:nvSpPr>
+        <p:spPr>
+          <a:xfrm>
+            <a:off x="8080321" y="4916422"/>
+            <a:ext cx="3815255" cy="923330"/>
+          </a:xfrm>
+          <a:prstGeom prst="rect">
+            <a:avLst/>
+          </a:prstGeom>
+          <a:noFill/>
+        </p:spPr>
+        <p:txBody>
+          <a:bodyPr wrap="square" rtlCol="0">
+            <a:spAutoFit/>
+          </a:bodyPr>
+          <a:lstStyle/>
+          <a:p>
+            <a:r>
+              <a:rPr lang="en-US" dirty="0">
+                <a:latin typeface="Calibri" panose="020F0502020204030204" pitchFamily="34" charset="0"/>
+                <a:cs typeface="Calibri" panose="020F0502020204030204" pitchFamily="34" charset="0"/>
+              </a:rPr>
+              <a:t>Multiple sequence FASTA obtained by simply concatenating multiple FASTA records together</a:t>
+            </a:r>
+          </a:p>
+        </p:txBody>
+      </p:sp>
+    </p:spTree>
+    <p:extLst>
+      <p:ext uri="{BB962C8B-B14F-4D97-AF65-F5344CB8AC3E}">
+        <p14:creationId xmlns:p14="http://schemas.microsoft.com/office/powerpoint/2010/main" val="4219258120"/>
+      </p:ext>
+    </p:extLst>
+  </p:cSld>
+  <p:clrMapOvr>
+    <a:masterClrMapping/>
+  </p:clrMapOvr>
+</p:sld>
+</file>
+
+<file path=ppt/slides/slide3.xml><?xml version="1.0" encoding="utf-8"?>
+<p:sld xmlns:a="http://schemas.openxmlformats.org/drawingml/2006/main" xmlns:r="http://schemas.openxmlformats.org/officeDocument/2006/relationships" xmlns:p="http://schemas.openxmlformats.org/presentationml/2006/main">
+  <p:cSld>
+    <p:spTree>
+      <p:nvGrpSpPr>
+        <p:cNvPr id="1" name=""/>
+        <p:cNvGrpSpPr/>
+        <p:nvPr/>
+      </p:nvGrpSpPr>
+      <p:grpSpPr>
+        <a:xfrm>
+          <a:off x="0" y="0"/>
+          <a:ext cx="0" cy="0"/>
+          <a:chOff x="0" y="0"/>
+          <a:chExt cx="0" cy="0"/>
+        </a:xfrm>
+      </p:grpSpPr>
+      <p:sp>
+        <p:nvSpPr>
+          <p:cNvPr id="2" name="Title 1"/>
+          <p:cNvSpPr>
+            <a:spLocks noGrp="1"/>
+          </p:cNvSpPr>
+          <p:nvPr>
+            <p:ph type="title"/>
+          </p:nvPr>
+        </p:nvSpPr>
+        <p:spPr>
+          <a:xfrm>
+            <a:off x="304800" y="111850"/>
+            <a:ext cx="11684000" cy="949695"/>
+          </a:xfrm>
+        </p:spPr>
+        <p:txBody>
+          <a:bodyPr>
+            <a:noAutofit/>
+          </a:bodyPr>
+          <a:lstStyle/>
+          <a:p>
+            <a:r>
+              <a:rPr lang="en-US" sz="3600" b="1" dirty="0" err="1">
+                <a:latin typeface="Calibri" panose="020F0502020204030204" pitchFamily="34" charset="0"/>
+                <a:cs typeface="Calibri" panose="020F0502020204030204" pitchFamily="34" charset="0"/>
+              </a:rPr>
+              <a:t>Fastq</a:t>
+            </a:r>
+            <a:r>
+              <a:rPr lang="en-US" sz="3600" b="1" dirty="0">
+                <a:latin typeface="Calibri" panose="020F0502020204030204" pitchFamily="34" charset="0"/>
+                <a:cs typeface="Calibri" panose="020F0502020204030204" pitchFamily="34" charset="0"/>
+              </a:rPr>
+              <a:t> – format for representing raw sequence – base calls and quality values</a:t>
+            </a:r>
+          </a:p>
+        </p:txBody>
+      </p:sp>
+      <p:sp>
+        <p:nvSpPr>
+          <p:cNvPr id="3" name="Content Placeholder 2"/>
+          <p:cNvSpPr>
+            <a:spLocks noGrp="1"/>
+          </p:cNvSpPr>
+          <p:nvPr>
+            <p:ph idx="1"/>
+          </p:nvPr>
+        </p:nvSpPr>
+        <p:spPr>
+          <a:xfrm>
+            <a:off x="304800" y="1354666"/>
+            <a:ext cx="8026400" cy="4817535"/>
+          </a:xfrm>
+        </p:spPr>
+        <p:txBody>
+          <a:bodyPr>
+            <a:noAutofit/>
+          </a:bodyPr>
+          <a:lstStyle/>
+          <a:p>
+            <a:pPr marL="0" indent="0">
+              <a:buNone/>
+            </a:pPr>
+            <a:r>
+              <a:rPr lang="en-US" sz="2667" dirty="0">
+                <a:latin typeface="Calibri" panose="020F0502020204030204" pitchFamily="34" charset="0"/>
+                <a:cs typeface="Calibri" panose="020F0502020204030204" pitchFamily="34" charset="0"/>
+              </a:rPr>
+              <a:t>@HWI-ST718_146963544:6:1213:8996:10047/1</a:t>
+            </a:r>
+          </a:p>
+          <a:p>
+            <a:pPr marL="0" indent="0">
+              <a:buNone/>
+            </a:pPr>
+            <a:r>
+              <a:rPr lang="en-US" sz="2667" dirty="0">
+                <a:latin typeface="Calibri" panose="020F0502020204030204" pitchFamily="34" charset="0"/>
+                <a:cs typeface="Calibri" panose="020F0502020204030204" pitchFamily="34" charset="0"/>
+              </a:rPr>
+              <a:t>CTTTTTTATTTTTGTCTGACTGGGTTGATTCAAAA</a:t>
+            </a:r>
+          </a:p>
+          <a:p>
+            <a:pPr marL="0" indent="0">
+              <a:buNone/>
+            </a:pPr>
+            <a:r>
+              <a:rPr lang="en-US" sz="2667" dirty="0">
+                <a:latin typeface="Calibri" panose="020F0502020204030204" pitchFamily="34" charset="0"/>
+                <a:cs typeface="Calibri" panose="020F0502020204030204" pitchFamily="34" charset="0"/>
+              </a:rPr>
+              <a:t>+</a:t>
+            </a:r>
+          </a:p>
+          <a:p>
+            <a:pPr marL="0" indent="0">
+              <a:buNone/>
+            </a:pPr>
+            <a:r>
+              <a:rPr lang="en-US" sz="2667" dirty="0">
+                <a:latin typeface="Calibri" panose="020F0502020204030204" pitchFamily="34" charset="0"/>
+                <a:cs typeface="Calibri" panose="020F0502020204030204" pitchFamily="34" charset="0"/>
+              </a:rPr>
+              <a:t>CCCFFFFFHHHHGJHIIJHIHIIIFHIJJJJIJJGIBBFGE</a:t>
+            </a:r>
+          </a:p>
+          <a:p>
+            <a:pPr marL="0" indent="0">
+              <a:buNone/>
+            </a:pPr>
+            <a:endParaRPr lang="en-US" sz="2667" dirty="0">
+              <a:latin typeface="Calibri" panose="020F0502020204030204" pitchFamily="34" charset="0"/>
+              <a:cs typeface="Calibri" panose="020F0502020204030204" pitchFamily="34" charset="0"/>
+            </a:endParaRPr>
+          </a:p>
+          <a:p>
+            <a:pPr marL="0" indent="0">
+              <a:buNone/>
+            </a:pPr>
+            <a:r>
+              <a:rPr lang="en-US" sz="2667" dirty="0">
+                <a:latin typeface="Calibri" panose="020F0502020204030204" pitchFamily="34" charset="0"/>
+                <a:cs typeface="Calibri" panose="020F0502020204030204" pitchFamily="34" charset="0"/>
+              </a:rPr>
+              <a:t>@HWI-ST718_146963544:5:2303:11793:37095/1</a:t>
+            </a:r>
+          </a:p>
+          <a:p>
+            <a:pPr marL="0" indent="0">
+              <a:buNone/>
+            </a:pPr>
+            <a:r>
+              <a:rPr lang="en-US" sz="2667" dirty="0">
+                <a:latin typeface="Calibri" panose="020F0502020204030204" pitchFamily="34" charset="0"/>
+                <a:cs typeface="Calibri" panose="020F0502020204030204" pitchFamily="34" charset="0"/>
+              </a:rPr>
+              <a:t>ATGAATTATAGGGCTGTATTTTAATTTTGCATTTTAA</a:t>
+            </a:r>
+          </a:p>
+          <a:p>
+            <a:pPr marL="0" indent="0">
+              <a:buNone/>
+            </a:pPr>
+            <a:r>
+              <a:rPr lang="en-US" sz="2667" dirty="0">
+                <a:latin typeface="Calibri" panose="020F0502020204030204" pitchFamily="34" charset="0"/>
+                <a:cs typeface="Calibri" panose="020F0502020204030204" pitchFamily="34" charset="0"/>
+              </a:rPr>
+              <a:t>+</a:t>
+            </a:r>
+          </a:p>
+          <a:p>
+            <a:pPr marL="0" indent="0">
+              <a:buNone/>
+            </a:pPr>
+            <a:r>
+              <a:rPr lang="en-US" sz="2667" dirty="0">
+                <a:latin typeface="Calibri" panose="020F0502020204030204" pitchFamily="34" charset="0"/>
+                <a:cs typeface="Calibri" panose="020F0502020204030204" pitchFamily="34" charset="0"/>
+              </a:rPr>
+              <a:t>@@??BDDFFF&lt;FHEGFFGGIEBGHIIIIIBEHIIGIH&lt;FHE</a:t>
+            </a:r>
+          </a:p>
+        </p:txBody>
+      </p:sp>
+      <p:sp>
+        <p:nvSpPr>
+          <p:cNvPr id="4" name="TextBox 3">
+            <a:extLst>
+              <a:ext uri="{FF2B5EF4-FFF2-40B4-BE49-F238E27FC236}">
+                <a16:creationId xmlns:a16="http://schemas.microsoft.com/office/drawing/2014/main" id="{19BBC957-3CDA-C642-82A9-C6B485DF2732}"/>
+              </a:ext>
+            </a:extLst>
+          </p:cNvPr>
+          <p:cNvSpPr txBox="1"/>
+          <p:nvPr/>
+        </p:nvSpPr>
+        <p:spPr>
+          <a:xfrm>
+            <a:off x="7866009" y="819754"/>
+            <a:ext cx="3815255" cy="923330"/>
+          </a:xfrm>
+          <a:prstGeom prst="rect">
+            <a:avLst/>
+          </a:prstGeom>
+          <a:noFill/>
+        </p:spPr>
+        <p:txBody>
+          <a:bodyPr wrap="square" rtlCol="0">
+            <a:spAutoFit/>
+          </a:bodyPr>
+          <a:lstStyle/>
+          <a:p>
+            <a:r>
+              <a:rPr lang="en-US" dirty="0">
+                <a:latin typeface="Calibri" panose="020F0502020204030204" pitchFamily="34" charset="0"/>
+                <a:cs typeface="Calibri" panose="020F0502020204030204" pitchFamily="34" charset="0"/>
+              </a:rPr>
+              <a:t>First line starts with “@” header or ”Comment”; followed by sequence identifier and optional description</a:t>
+            </a:r>
+          </a:p>
+        </p:txBody>
+      </p:sp>
+      <p:cxnSp>
+        <p:nvCxnSpPr>
+          <p:cNvPr id="5" name="Straight Connector 4">
+            <a:extLst>
+              <a:ext uri="{FF2B5EF4-FFF2-40B4-BE49-F238E27FC236}">
+                <a16:creationId xmlns:a16="http://schemas.microsoft.com/office/drawing/2014/main" id="{3B04837A-3716-1243-801B-EB947C4190F8}"/>
+              </a:ext>
+            </a:extLst>
+          </p:cNvPr>
+          <p:cNvCxnSpPr/>
+          <p:nvPr/>
+        </p:nvCxnSpPr>
+        <p:spPr>
+          <a:xfrm>
+            <a:off x="7248195" y="1343845"/>
+            <a:ext cx="0" cy="367862"/>
+          </a:xfrm>
+          <a:prstGeom prst="line">
+            <a:avLst/>
+          </a:prstGeom>
+          <a:ln w="50800">
+            <a:solidFill>
+              <a:srgbClr val="FF0000"/>
+            </a:solidFill>
+          </a:ln>
+        </p:spPr>
+        <p:style>
+          <a:lnRef idx="1">
+            <a:schemeClr val="accent1"/>
+          </a:lnRef>
+          <a:fillRef idx="0">
+            <a:schemeClr val="accent1"/>
+          </a:fillRef>
+          <a:effectRef idx="0">
+            <a:schemeClr val="accent1"/>
+          </a:effectRef>
+          <a:fontRef idx="minor">
+            <a:schemeClr val="tx1"/>
+          </a:fontRef>
+        </p:style>
+      </p:cxnSp>
+      <p:cxnSp>
+        <p:nvCxnSpPr>
+          <p:cNvPr id="6" name="Straight Connector 5">
+            <a:extLst>
+              <a:ext uri="{FF2B5EF4-FFF2-40B4-BE49-F238E27FC236}">
+                <a16:creationId xmlns:a16="http://schemas.microsoft.com/office/drawing/2014/main" id="{22FDCBB5-5E95-484C-B809-DDA09776CFAB}"/>
+              </a:ext>
+            </a:extLst>
+          </p:cNvPr>
+          <p:cNvCxnSpPr/>
+          <p:nvPr/>
+        </p:nvCxnSpPr>
+        <p:spPr>
+          <a:xfrm>
+            <a:off x="7248195" y="1871676"/>
+            <a:ext cx="0" cy="367862"/>
+          </a:xfrm>
+          <a:prstGeom prst="line">
+            <a:avLst/>
+          </a:prstGeom>
+          <a:ln w="50800">
+            <a:solidFill>
+              <a:srgbClr val="FF0000"/>
+            </a:solidFill>
+          </a:ln>
+        </p:spPr>
+        <p:style>
+          <a:lnRef idx="1">
+            <a:schemeClr val="accent1"/>
+          </a:lnRef>
+          <a:fillRef idx="0">
+            <a:schemeClr val="accent1"/>
+          </a:fillRef>
+          <a:effectRef idx="0">
+            <a:schemeClr val="accent1"/>
+          </a:effectRef>
+          <a:fontRef idx="minor">
+            <a:schemeClr val="tx1"/>
+          </a:fontRef>
+        </p:style>
+      </p:cxnSp>
+      <p:cxnSp>
+        <p:nvCxnSpPr>
+          <p:cNvPr id="7" name="Straight Connector 6">
+            <a:extLst>
+              <a:ext uri="{FF2B5EF4-FFF2-40B4-BE49-F238E27FC236}">
+                <a16:creationId xmlns:a16="http://schemas.microsoft.com/office/drawing/2014/main" id="{FD24E734-D6F2-5245-8F11-FAAE402C16CC}"/>
+              </a:ext>
+            </a:extLst>
+          </p:cNvPr>
+          <p:cNvCxnSpPr>
+            <a:cxnSpLocks/>
+            <a:stCxn id="4" idx="1"/>
+          </p:cNvCxnSpPr>
+          <p:nvPr/>
+        </p:nvCxnSpPr>
+        <p:spPr>
+          <a:xfrm flipH="1">
+            <a:off x="7248195" y="1281419"/>
+            <a:ext cx="617814" cy="261631"/>
+          </a:xfrm>
+          <a:prstGeom prst="line">
+            <a:avLst/>
+          </a:prstGeom>
+          <a:ln w="50800">
+            <a:solidFill>
+              <a:srgbClr val="FF0000"/>
+            </a:solidFill>
+          </a:ln>
+        </p:spPr>
+        <p:style>
+          <a:lnRef idx="1">
+            <a:schemeClr val="accent1"/>
+          </a:lnRef>
+          <a:fillRef idx="0">
+            <a:schemeClr val="accent1"/>
+          </a:fillRef>
+          <a:effectRef idx="0">
+            <a:schemeClr val="accent1"/>
+          </a:effectRef>
+          <a:fontRef idx="minor">
+            <a:schemeClr val="tx1"/>
+          </a:fontRef>
+        </p:style>
+      </p:cxnSp>
+      <p:cxnSp>
+        <p:nvCxnSpPr>
+          <p:cNvPr id="10" name="Straight Connector 9">
+            <a:extLst>
+              <a:ext uri="{FF2B5EF4-FFF2-40B4-BE49-F238E27FC236}">
+                <a16:creationId xmlns:a16="http://schemas.microsoft.com/office/drawing/2014/main" id="{61DD2357-69F7-3C4F-B715-BB004FB11B64}"/>
+              </a:ext>
+            </a:extLst>
+          </p:cNvPr>
+          <p:cNvCxnSpPr>
+            <a:cxnSpLocks/>
+            <a:stCxn id="12" idx="1"/>
+          </p:cNvCxnSpPr>
+          <p:nvPr/>
+        </p:nvCxnSpPr>
+        <p:spPr>
+          <a:xfrm flipH="1" flipV="1">
+            <a:off x="7248195" y="2055607"/>
+            <a:ext cx="617814" cy="59678"/>
+          </a:xfrm>
+          <a:prstGeom prst="line">
+            <a:avLst/>
+          </a:prstGeom>
+          <a:ln w="50800">
+            <a:solidFill>
+              <a:srgbClr val="FF0000"/>
+            </a:solidFill>
+          </a:ln>
+        </p:spPr>
+        <p:style>
+          <a:lnRef idx="1">
+            <a:schemeClr val="accent1"/>
+          </a:lnRef>
+          <a:fillRef idx="0">
+            <a:schemeClr val="accent1"/>
+          </a:fillRef>
+          <a:effectRef idx="0">
+            <a:schemeClr val="accent1"/>
+          </a:effectRef>
+          <a:fontRef idx="minor">
+            <a:schemeClr val="tx1"/>
+          </a:fontRef>
+        </p:style>
+      </p:cxnSp>
+      <p:sp>
+        <p:nvSpPr>
+          <p:cNvPr id="12" name="TextBox 11">
+            <a:extLst>
+              <a:ext uri="{FF2B5EF4-FFF2-40B4-BE49-F238E27FC236}">
+                <a16:creationId xmlns:a16="http://schemas.microsoft.com/office/drawing/2014/main" id="{E900BF09-2E18-AB46-9663-89B3F830FD0E}"/>
+              </a:ext>
+            </a:extLst>
+          </p:cNvPr>
+          <p:cNvSpPr txBox="1"/>
+          <p:nvPr/>
+        </p:nvSpPr>
+        <p:spPr>
+          <a:xfrm>
+            <a:off x="7866009" y="1930619"/>
+            <a:ext cx="3815255" cy="369332"/>
+          </a:xfrm>
+          <a:prstGeom prst="rect">
+            <a:avLst/>
+          </a:prstGeom>
+          <a:noFill/>
+        </p:spPr>
+        <p:txBody>
+          <a:bodyPr wrap="square" rtlCol="0">
+            <a:spAutoFit/>
+          </a:bodyPr>
+          <a:lstStyle/>
+          <a:p>
+            <a:r>
+              <a:rPr lang="en-US" dirty="0">
+                <a:latin typeface="Calibri" panose="020F0502020204030204" pitchFamily="34" charset="0"/>
+                <a:cs typeface="Calibri" panose="020F0502020204030204" pitchFamily="34" charset="0"/>
+              </a:rPr>
+              <a:t>Sequence line</a:t>
+            </a:r>
+          </a:p>
+        </p:txBody>
+      </p:sp>
+    </p:spTree>
+    <p:extLst>
+      <p:ext uri="{BB962C8B-B14F-4D97-AF65-F5344CB8AC3E}">
+        <p14:creationId xmlns:p14="http://schemas.microsoft.com/office/powerpoint/2010/main" val="3652896461"/>
+      </p:ext>
+    </p:extLst>
+  </p:cSld>
+  <p:clrMapOvr>
+    <a:masterClrMapping/>
+  </p:clrMapOvr>
+</p:sld>
+</file>
+
+<file path=ppt/slides/slide4.xml><?xml version="1.0" encoding="utf-8"?>
+<p:sld xmlns:a="http://schemas.openxmlformats.org/drawingml/2006/main" xmlns:r="http://schemas.openxmlformats.org/officeDocument/2006/relationships" xmlns:p="http://schemas.openxmlformats.org/presentationml/2006/main">
+  <p:cSld>
+    <p:spTree>
+      <p:nvGrpSpPr>
+        <p:cNvPr id="1" name=""/>
+        <p:cNvGrpSpPr/>
+        <p:nvPr/>
+      </p:nvGrpSpPr>
+      <p:grpSpPr>
+        <a:xfrm>
+          <a:off x="0" y="0"/>
+          <a:ext cx="0" cy="0"/>
+          <a:chOff x="0" y="0"/>
+          <a:chExt cx="0" cy="0"/>
+        </a:xfrm>
+      </p:grpSpPr>
+      <p:sp>
+        <p:nvSpPr>
+          <p:cNvPr id="2" name="Title 1"/>
+          <p:cNvSpPr>
+            <a:spLocks noGrp="1"/>
+          </p:cNvSpPr>
+          <p:nvPr>
+            <p:ph type="title"/>
+          </p:nvPr>
+        </p:nvSpPr>
+        <p:spPr>
+          <a:xfrm>
+            <a:off x="304800" y="111850"/>
+            <a:ext cx="11684000" cy="949695"/>
+          </a:xfrm>
+        </p:spPr>
+        <p:txBody>
+          <a:bodyPr>
+            <a:noAutofit/>
+          </a:bodyPr>
+          <a:lstStyle/>
+          <a:p>
+            <a:r>
+              <a:rPr lang="en-US" sz="3600" b="1" dirty="0" err="1">
+                <a:latin typeface="Calibri" panose="020F0502020204030204" pitchFamily="34" charset="0"/>
+                <a:cs typeface="Calibri" panose="020F0502020204030204" pitchFamily="34" charset="0"/>
+              </a:rPr>
+              <a:t>Fastq</a:t>
+            </a:r>
+            <a:r>
+              <a:rPr lang="en-US" sz="3600" b="1" dirty="0">
+                <a:latin typeface="Calibri" panose="020F0502020204030204" pitchFamily="34" charset="0"/>
+                <a:cs typeface="Calibri" panose="020F0502020204030204" pitchFamily="34" charset="0"/>
+              </a:rPr>
+              <a:t> – format for representing raw sequence – base calls and quality values</a:t>
+            </a:r>
+          </a:p>
+        </p:txBody>
+      </p:sp>
+      <p:sp>
+        <p:nvSpPr>
+          <p:cNvPr id="3" name="Content Placeholder 2"/>
+          <p:cNvSpPr>
+            <a:spLocks noGrp="1"/>
+          </p:cNvSpPr>
+          <p:nvPr>
+            <p:ph idx="1"/>
+          </p:nvPr>
+        </p:nvSpPr>
+        <p:spPr>
+          <a:xfrm>
+            <a:off x="304800" y="1354666"/>
+            <a:ext cx="8026400" cy="4817535"/>
+          </a:xfrm>
+        </p:spPr>
+        <p:txBody>
+          <a:bodyPr>
+            <a:noAutofit/>
+          </a:bodyPr>
+          <a:lstStyle/>
+          <a:p>
+            <a:pPr marL="0" indent="0">
+              <a:buNone/>
+            </a:pPr>
+            <a:r>
+              <a:rPr lang="en-US" sz="2667" dirty="0">
+                <a:latin typeface="Calibri" panose="020F0502020204030204" pitchFamily="34" charset="0"/>
+                <a:cs typeface="Calibri" panose="020F0502020204030204" pitchFamily="34" charset="0"/>
+              </a:rPr>
+              <a:t>@HWI-ST718_146963544:6:1213:8996:10047/1</a:t>
+            </a:r>
+          </a:p>
+          <a:p>
+            <a:pPr marL="0" indent="0">
+              <a:buNone/>
+            </a:pPr>
+            <a:r>
+              <a:rPr lang="en-US" sz="2667" dirty="0">
+                <a:latin typeface="Calibri" panose="020F0502020204030204" pitchFamily="34" charset="0"/>
+                <a:cs typeface="Calibri" panose="020F0502020204030204" pitchFamily="34" charset="0"/>
+              </a:rPr>
+              <a:t>CTTTTTTATTTTTGTCTGACTGGGTTGATTCAAAA</a:t>
+            </a:r>
+          </a:p>
+          <a:p>
+            <a:pPr marL="0" indent="0">
+              <a:buNone/>
+            </a:pPr>
+            <a:r>
+              <a:rPr lang="en-US" sz="2667" dirty="0">
+                <a:latin typeface="Calibri" panose="020F0502020204030204" pitchFamily="34" charset="0"/>
+                <a:cs typeface="Calibri" panose="020F0502020204030204" pitchFamily="34" charset="0"/>
+              </a:rPr>
+              <a:t>+</a:t>
+            </a:r>
+          </a:p>
+          <a:p>
+            <a:pPr marL="0" indent="0">
+              <a:buNone/>
+            </a:pPr>
+            <a:r>
+              <a:rPr lang="en-US" sz="2667" dirty="0">
+                <a:latin typeface="Calibri" panose="020F0502020204030204" pitchFamily="34" charset="0"/>
+                <a:cs typeface="Calibri" panose="020F0502020204030204" pitchFamily="34" charset="0"/>
+              </a:rPr>
+              <a:t>CCCFFFFFHHHHGJHIIJHIHIIIFHIJJJJIJJGIBBFGE</a:t>
+            </a:r>
+          </a:p>
+          <a:p>
+            <a:pPr marL="0" indent="0">
+              <a:buNone/>
+            </a:pPr>
+            <a:endParaRPr lang="en-US" sz="2667" dirty="0">
+              <a:latin typeface="Calibri" panose="020F0502020204030204" pitchFamily="34" charset="0"/>
+              <a:cs typeface="Calibri" panose="020F0502020204030204" pitchFamily="34" charset="0"/>
+            </a:endParaRPr>
+          </a:p>
+          <a:p>
+            <a:pPr marL="0" indent="0">
+              <a:buNone/>
+            </a:pPr>
+            <a:r>
+              <a:rPr lang="en-US" sz="2667" dirty="0">
+                <a:latin typeface="Calibri" panose="020F0502020204030204" pitchFamily="34" charset="0"/>
+                <a:cs typeface="Calibri" panose="020F0502020204030204" pitchFamily="34" charset="0"/>
+              </a:rPr>
+              <a:t>@HWI-ST718_146963544:5:2303:11793:37095/1</a:t>
+            </a:r>
+          </a:p>
+          <a:p>
+            <a:pPr marL="0" indent="0">
+              <a:buNone/>
+            </a:pPr>
+            <a:r>
+              <a:rPr lang="en-US" sz="2667" dirty="0">
+                <a:latin typeface="Calibri" panose="020F0502020204030204" pitchFamily="34" charset="0"/>
+                <a:cs typeface="Calibri" panose="020F0502020204030204" pitchFamily="34" charset="0"/>
+              </a:rPr>
+              <a:t>ATGAATTATAGGGCTGTATTTTAATTTTGCATTTTAA</a:t>
+            </a:r>
+          </a:p>
+          <a:p>
+            <a:pPr marL="0" indent="0">
+              <a:buNone/>
+            </a:pPr>
+            <a:r>
+              <a:rPr lang="en-US" sz="2667" dirty="0">
+                <a:latin typeface="Calibri" panose="020F0502020204030204" pitchFamily="34" charset="0"/>
+                <a:cs typeface="Calibri" panose="020F0502020204030204" pitchFamily="34" charset="0"/>
+              </a:rPr>
+              <a:t>+</a:t>
+            </a:r>
+          </a:p>
+          <a:p>
+            <a:pPr marL="0" indent="0">
+              <a:buNone/>
+            </a:pPr>
+            <a:r>
+              <a:rPr lang="en-US" sz="2667" dirty="0">
+                <a:latin typeface="Calibri" panose="020F0502020204030204" pitchFamily="34" charset="0"/>
+                <a:cs typeface="Calibri" panose="020F0502020204030204" pitchFamily="34" charset="0"/>
+              </a:rPr>
+              <a:t>@@??BDDFFF&lt;FHEGFFGGIEBGHIIIIIBEHIIGIH&lt;FHE</a:t>
+            </a:r>
+          </a:p>
+        </p:txBody>
+      </p:sp>
+    </p:spTree>
+    <p:extLst>
+      <p:ext uri="{BB962C8B-B14F-4D97-AF65-F5344CB8AC3E}">
+        <p14:creationId xmlns:p14="http://schemas.microsoft.com/office/powerpoint/2010/main" val="3845206435"/>
+      </p:ext>
+    </p:extLst>
+  </p:cSld>
+  <p:clrMapOvr>
+    <a:masterClrMapping/>
+  </p:clrMapOvr>
+</p:sld>
+</file>
+
+<file path=ppt/slides/slide5.xml><?xml version="1.0" encoding="utf-8"?>
+<p:sld xmlns:a="http://schemas.openxmlformats.org/drawingml/2006/main" xmlns:r="http://schemas.openxmlformats.org/officeDocument/2006/relationships" xmlns:p="http://schemas.openxmlformats.org/presentationml/2006/main">
+  <p:cSld>
+    <p:spTree>
+      <p:nvGrpSpPr>
+        <p:cNvPr id="1" name=""/>
+        <p:cNvGrpSpPr/>
+        <p:nvPr/>
+      </p:nvGrpSpPr>
+      <p:grpSpPr>
+        <a:xfrm>
+          <a:off x="0" y="0"/>
+          <a:ext cx="0" cy="0"/>
+          <a:chOff x="0" y="0"/>
+          <a:chExt cx="0" cy="0"/>
+        </a:xfrm>
+      </p:grpSpPr>
+      <p:sp>
+        <p:nvSpPr>
+          <p:cNvPr id="2" name="Title 1"/>
+          <p:cNvSpPr>
+            <a:spLocks noGrp="1"/>
+          </p:cNvSpPr>
+          <p:nvPr>
+            <p:ph type="title"/>
+          </p:nvPr>
+        </p:nvSpPr>
+        <p:spPr>
+          <a:xfrm>
+            <a:off x="381000" y="0"/>
+            <a:ext cx="11453648" cy="819807"/>
+          </a:xfrm>
+        </p:spPr>
+        <p:txBody>
+          <a:bodyPr>
+            <a:normAutofit/>
+          </a:bodyPr>
+          <a:lstStyle/>
+          <a:p>
+            <a:r>
+              <a:rPr lang="en-US" sz="4000" dirty="0" err="1">
+                <a:latin typeface="Calibri" panose="020F0502020204030204" pitchFamily="34" charset="0"/>
+                <a:cs typeface="Calibri" panose="020F0502020204030204" pitchFamily="34" charset="0"/>
+              </a:rPr>
+              <a:t>Phred</a:t>
+            </a:r>
+            <a:r>
+              <a:rPr lang="en-US" sz="4000" dirty="0">
+                <a:latin typeface="Calibri" panose="020F0502020204030204" pitchFamily="34" charset="0"/>
+                <a:cs typeface="Calibri" panose="020F0502020204030204" pitchFamily="34" charset="0"/>
+              </a:rPr>
+              <a:t> scores and ASCII glyphs</a:t>
+            </a:r>
+          </a:p>
+        </p:txBody>
+      </p:sp>
+      <p:graphicFrame>
+        <p:nvGraphicFramePr>
+          <p:cNvPr id="7" name="Table 6"/>
+          <p:cNvGraphicFramePr>
+            <a:graphicFrameLocks noGrp="1"/>
+          </p:cNvGraphicFramePr>
+          <p:nvPr>
+            <p:extLst>
+              <p:ext uri="{D42A27DB-BD31-4B8C-83A1-F6EECF244321}">
+                <p14:modId xmlns:p14="http://schemas.microsoft.com/office/powerpoint/2010/main" val="3171265672"/>
+              </p:ext>
+            </p:extLst>
+          </p:nvPr>
+        </p:nvGraphicFramePr>
+        <p:xfrm>
+          <a:off x="1639614" y="716712"/>
+          <a:ext cx="8055427" cy="3238435"/>
+        </p:xfrm>
+        <a:graphic>
+          <a:graphicData uri="http://schemas.openxmlformats.org/drawingml/2006/table">
+            <a:tbl>
+              <a:tblPr firstRow="1" bandRow="1">
+                <a:tableStyleId>{5C22544A-7EE6-4342-B048-85BDC9FD1C3A}</a:tableStyleId>
+              </a:tblPr>
+              <a:tblGrid>
+                <a:gridCol w="1219200">
+                  <a:extLst>
+                    <a:ext uri="{9D8B030D-6E8A-4147-A177-3AD203B41FA5}">
+                      <a16:colId xmlns:a16="http://schemas.microsoft.com/office/drawing/2014/main" val="20000"/>
+                    </a:ext>
+                  </a:extLst>
+                </a:gridCol>
+                <a:gridCol w="2002971">
+                  <a:extLst>
+                    <a:ext uri="{9D8B030D-6E8A-4147-A177-3AD203B41FA5}">
+                      <a16:colId xmlns:a16="http://schemas.microsoft.com/office/drawing/2014/main" val="20001"/>
+                    </a:ext>
+                  </a:extLst>
+                </a:gridCol>
+                <a:gridCol w="1349829">
+                  <a:extLst>
+                    <a:ext uri="{9D8B030D-6E8A-4147-A177-3AD203B41FA5}">
+                      <a16:colId xmlns:a16="http://schemas.microsoft.com/office/drawing/2014/main" val="20002"/>
+                    </a:ext>
+                  </a:extLst>
+                </a:gridCol>
+                <a:gridCol w="1422400">
+                  <a:extLst>
+                    <a:ext uri="{9D8B030D-6E8A-4147-A177-3AD203B41FA5}">
+                      <a16:colId xmlns:a16="http://schemas.microsoft.com/office/drawing/2014/main" val="20003"/>
+                    </a:ext>
+                  </a:extLst>
+                </a:gridCol>
+                <a:gridCol w="2061027">
+                  <a:extLst>
+                    <a:ext uri="{9D8B030D-6E8A-4147-A177-3AD203B41FA5}">
+                      <a16:colId xmlns:a16="http://schemas.microsoft.com/office/drawing/2014/main" val="20004"/>
+                    </a:ext>
+                  </a:extLst>
+                </a:gridCol>
+              </a:tblGrid>
+              <a:tr h="870373">
+                <a:tc>
+                  <a:txBody>
+                    <a:bodyPr/>
+                    <a:lstStyle/>
+                    <a:p>
+                      <a:pPr algn="ctr" fontAlgn="b"/>
+                      <a:r>
+                        <a:rPr lang="en-US" sz="1900" b="1" i="0" u="none" strike="noStrike" dirty="0" err="1">
+                          <a:solidFill>
+                            <a:srgbClr val="333333"/>
+                          </a:solidFill>
+                          <a:effectLst/>
+                          <a:latin typeface="+mn-lt"/>
+                        </a:rPr>
+                        <a:t>Phred</a:t>
+                      </a:r>
+                      <a:r>
+                        <a:rPr lang="en-US" sz="1900" b="1" i="0" u="none" strike="noStrike" dirty="0">
+                          <a:solidFill>
+                            <a:srgbClr val="333333"/>
+                          </a:solidFill>
+                          <a:effectLst/>
+                          <a:latin typeface="+mn-lt"/>
+                        </a:rPr>
+                        <a:t> Q</a:t>
+                      </a:r>
+                    </a:p>
+                  </a:txBody>
+                  <a:tcPr marL="16933" marR="16933" marT="16933" marB="0" anchor="b"/>
+                </a:tc>
+                <a:tc>
+                  <a:txBody>
+                    <a:bodyPr/>
+                    <a:lstStyle/>
+                    <a:p>
+                      <a:pPr algn="ctr" fontAlgn="b"/>
+                      <a:r>
+                        <a:rPr lang="en-US" sz="1900" b="1" i="0" u="none" strike="noStrike" dirty="0">
+                          <a:solidFill>
+                            <a:srgbClr val="333333"/>
+                          </a:solidFill>
+                          <a:effectLst/>
+                          <a:latin typeface="+mn-lt"/>
+                        </a:rPr>
+                        <a:t>Probability (P) of Wrong Base</a:t>
+                      </a:r>
+                    </a:p>
+                  </a:txBody>
+                  <a:tcPr marL="16933" marR="16933" marT="16933" marB="0" anchor="b"/>
+                </a:tc>
+                <a:tc>
+                  <a:txBody>
+                    <a:bodyPr/>
+                    <a:lstStyle/>
+                    <a:p>
+                      <a:pPr algn="ctr" fontAlgn="b"/>
+                      <a:r>
+                        <a:rPr lang="en-US" sz="1900" b="1" i="0" u="none" strike="noStrike" dirty="0">
+                          <a:solidFill>
+                            <a:srgbClr val="333333"/>
+                          </a:solidFill>
+                          <a:effectLst/>
+                          <a:latin typeface="+mn-lt"/>
+                        </a:rPr>
+                        <a:t>Base</a:t>
+                      </a:r>
+                      <a:r>
+                        <a:rPr lang="en-US" sz="1900" b="1" i="0" u="none" strike="noStrike" baseline="0" dirty="0">
+                          <a:solidFill>
+                            <a:srgbClr val="333333"/>
+                          </a:solidFill>
+                          <a:effectLst/>
+                          <a:latin typeface="+mn-lt"/>
+                        </a:rPr>
+                        <a:t> Call Accuracy</a:t>
+                      </a:r>
+                      <a:endParaRPr lang="en-US" sz="1900" b="1" i="0" u="none" strike="noStrike" dirty="0">
+                        <a:solidFill>
+                          <a:srgbClr val="333333"/>
+                        </a:solidFill>
+                        <a:effectLst/>
+                        <a:latin typeface="+mn-lt"/>
+                      </a:endParaRPr>
+                    </a:p>
+                  </a:txBody>
+                  <a:tcPr marL="16933" marR="16933" marT="16933" marB="0" anchor="b"/>
+                </a:tc>
+                <a:tc>
+                  <a:txBody>
+                    <a:bodyPr/>
+                    <a:lstStyle/>
+                    <a:p>
+                      <a:pPr algn="ctr" fontAlgn="b"/>
+                      <a:r>
+                        <a:rPr lang="en-US" sz="1900" b="1" i="0" u="none" strike="noStrike" dirty="0">
+                          <a:solidFill>
+                            <a:srgbClr val="333333"/>
+                          </a:solidFill>
+                          <a:effectLst/>
+                          <a:latin typeface="+mn-lt"/>
+                        </a:rPr>
+                        <a:t>Sanger “Q + 33” Shift</a:t>
+                      </a:r>
+                    </a:p>
+                  </a:txBody>
+                  <a:tcPr marL="16933" marR="16933" marT="16933" marB="0" anchor="b"/>
+                </a:tc>
+                <a:tc>
+                  <a:txBody>
+                    <a:bodyPr/>
+                    <a:lstStyle/>
+                    <a:p>
+                      <a:pPr algn="ctr" fontAlgn="b"/>
+                      <a:r>
+                        <a:rPr lang="en-US" sz="1900" b="1" i="0" u="none" strike="noStrike" dirty="0">
+                          <a:solidFill>
+                            <a:srgbClr val="333333"/>
+                          </a:solidFill>
+                          <a:effectLst/>
+                          <a:latin typeface="+mn-lt"/>
+                        </a:rPr>
+                        <a:t>Sanger “Q + 33” Shift ASCII glyph</a:t>
+                      </a:r>
+                    </a:p>
+                  </a:txBody>
+                  <a:tcPr marL="16933" marR="16933" marT="16933" marB="0" anchor="b"/>
+                </a:tc>
+                <a:extLst>
+                  <a:ext uri="{0D108BD9-81ED-4DB2-BD59-A6C34878D82A}">
+                    <a16:rowId xmlns:a16="http://schemas.microsoft.com/office/drawing/2014/main" val="10000"/>
+                  </a:ext>
+                </a:extLst>
+              </a:tr>
+              <a:tr h="392137">
+                <a:tc>
+                  <a:txBody>
+                    <a:bodyPr/>
+                    <a:lstStyle/>
+                    <a:p>
+                      <a:pPr algn="ctr" fontAlgn="b"/>
+                      <a:r>
+                        <a:rPr lang="en-US" sz="1900" b="0" i="0" u="none" strike="noStrike" dirty="0">
+                          <a:solidFill>
+                            <a:srgbClr val="333333"/>
+                          </a:solidFill>
+                          <a:effectLst/>
+                          <a:latin typeface="+mn-lt"/>
+                        </a:rPr>
+                        <a:t>0</a:t>
+                      </a:r>
+                    </a:p>
+                  </a:txBody>
+                  <a:tcPr marL="16933" marR="16933" marT="16933" marB="0" anchor="b"/>
+                </a:tc>
+                <a:tc>
+                  <a:txBody>
+                    <a:bodyPr/>
+                    <a:lstStyle/>
+                    <a:p>
+                      <a:pPr algn="ctr" fontAlgn="b"/>
+                      <a:r>
+                        <a:rPr lang="en-US" sz="1900" b="0" i="0" u="none" strike="noStrike" dirty="0">
+                          <a:solidFill>
+                            <a:srgbClr val="333333"/>
+                          </a:solidFill>
+                          <a:effectLst/>
+                          <a:latin typeface="+mn-lt"/>
+                        </a:rPr>
+                        <a:t>1</a:t>
+                      </a:r>
+                    </a:p>
+                  </a:txBody>
+                  <a:tcPr marL="16933" marR="16933" marT="16933" marB="0" anchor="b"/>
+                </a:tc>
+                <a:tc>
+                  <a:txBody>
+                    <a:bodyPr/>
+                    <a:lstStyle/>
+                    <a:p>
+                      <a:pPr algn="ctr" fontAlgn="b"/>
+                      <a:r>
+                        <a:rPr lang="en-US" sz="1900" b="0" i="0" u="none" strike="noStrike" dirty="0">
+                          <a:solidFill>
+                            <a:srgbClr val="333333"/>
+                          </a:solidFill>
+                          <a:effectLst/>
+                          <a:latin typeface="+mn-lt"/>
+                        </a:rPr>
+                        <a:t>0</a:t>
+                      </a:r>
+                    </a:p>
+                  </a:txBody>
+                  <a:tcPr marL="16933" marR="16933" marT="16933" marB="0" anchor="b"/>
+                </a:tc>
+                <a:tc>
+                  <a:txBody>
+                    <a:bodyPr/>
+                    <a:lstStyle/>
+                    <a:p>
+                      <a:pPr algn="ctr" fontAlgn="b"/>
+                      <a:r>
+                        <a:rPr lang="en-US" sz="1900" b="0" i="0" u="none" strike="noStrike" dirty="0">
+                          <a:solidFill>
+                            <a:srgbClr val="333333"/>
+                          </a:solidFill>
+                          <a:effectLst/>
+                          <a:latin typeface="+mn-lt"/>
+                        </a:rPr>
+                        <a:t>33</a:t>
+                      </a:r>
+                    </a:p>
+                  </a:txBody>
+                  <a:tcPr marL="16933" marR="16933" marT="16933" marB="0" anchor="b"/>
+                </a:tc>
+                <a:tc>
+                  <a:txBody>
+                    <a:bodyPr/>
+                    <a:lstStyle/>
+                    <a:p>
+                      <a:pPr algn="ctr" fontAlgn="b"/>
+                      <a:r>
+                        <a:rPr lang="ru-RU" sz="1900" b="0" i="0" u="none" strike="noStrike">
+                          <a:solidFill>
+                            <a:srgbClr val="333333"/>
+                          </a:solidFill>
+                          <a:effectLst/>
+                          <a:latin typeface="+mn-lt"/>
+                        </a:rPr>
+                        <a:t>!</a:t>
+                      </a:r>
+                    </a:p>
+                  </a:txBody>
+                  <a:tcPr marL="16933" marR="16933" marT="16933" marB="0" anchor="b"/>
+                </a:tc>
+                <a:extLst>
+                  <a:ext uri="{0D108BD9-81ED-4DB2-BD59-A6C34878D82A}">
+                    <a16:rowId xmlns:a16="http://schemas.microsoft.com/office/drawing/2014/main" val="10001"/>
+                  </a:ext>
+                </a:extLst>
+              </a:tr>
+              <a:tr h="392137">
+                <a:tc>
+                  <a:txBody>
+                    <a:bodyPr/>
+                    <a:lstStyle/>
+                    <a:p>
+                      <a:pPr algn="ctr" fontAlgn="b"/>
+                      <a:r>
+                        <a:rPr lang="en-US" sz="1900" b="0" i="0" u="none" strike="noStrike">
+                          <a:solidFill>
+                            <a:srgbClr val="333333"/>
+                          </a:solidFill>
+                          <a:effectLst/>
+                          <a:latin typeface="+mn-lt"/>
+                        </a:rPr>
+                        <a:t>1</a:t>
+                      </a:r>
+                    </a:p>
+                  </a:txBody>
+                  <a:tcPr marL="16933" marR="16933" marT="16933" marB="0" anchor="b"/>
+                </a:tc>
+                <a:tc>
+                  <a:txBody>
+                    <a:bodyPr/>
+                    <a:lstStyle/>
+                    <a:p>
+                      <a:pPr algn="ctr" fontAlgn="b"/>
+                      <a:r>
+                        <a:rPr lang="is-IS" sz="1900" b="0" i="0" u="none" strike="noStrike" dirty="0">
+                          <a:solidFill>
+                            <a:srgbClr val="333333"/>
+                          </a:solidFill>
+                          <a:effectLst/>
+                          <a:latin typeface="+mn-lt"/>
+                        </a:rPr>
+                        <a:t>0.794</a:t>
+                      </a:r>
+                    </a:p>
+                  </a:txBody>
+                  <a:tcPr marL="16933" marR="16933" marT="16933" marB="0" anchor="b"/>
+                </a:tc>
+                <a:tc>
+                  <a:txBody>
+                    <a:bodyPr/>
+                    <a:lstStyle/>
+                    <a:p>
+                      <a:pPr algn="ctr" fontAlgn="b"/>
+                      <a:r>
+                        <a:rPr lang="en-US" sz="1900" b="0" i="0" u="none" strike="noStrike" dirty="0">
+                          <a:solidFill>
+                            <a:srgbClr val="333333"/>
+                          </a:solidFill>
+                          <a:effectLst/>
+                          <a:latin typeface="+mn-lt"/>
+                        </a:rPr>
+                        <a:t>0.206</a:t>
+                      </a:r>
+                      <a:endParaRPr lang="ru-RU" sz="1900" b="0" i="0" u="none" strike="noStrike" dirty="0">
+                        <a:solidFill>
+                          <a:srgbClr val="333333"/>
+                        </a:solidFill>
+                        <a:effectLst/>
+                        <a:latin typeface="+mn-lt"/>
+                      </a:endParaRPr>
+                    </a:p>
+                  </a:txBody>
+                  <a:tcPr marL="16933" marR="16933" marT="16933" marB="0" anchor="b"/>
+                </a:tc>
+                <a:tc>
+                  <a:txBody>
+                    <a:bodyPr/>
+                    <a:lstStyle/>
+                    <a:p>
+                      <a:pPr algn="ctr" fontAlgn="b"/>
+                      <a:r>
+                        <a:rPr lang="ru-RU" sz="1900" b="0" i="0" u="none" strike="noStrike" dirty="0">
+                          <a:solidFill>
+                            <a:srgbClr val="333333"/>
+                          </a:solidFill>
+                          <a:effectLst/>
+                          <a:latin typeface="+mn-lt"/>
+                        </a:rPr>
+                        <a:t>34</a:t>
+                      </a:r>
+                    </a:p>
+                  </a:txBody>
+                  <a:tcPr marL="16933" marR="16933" marT="16933" marB="0" anchor="b"/>
+                </a:tc>
+                <a:tc>
+                  <a:txBody>
+                    <a:bodyPr/>
+                    <a:lstStyle/>
+                    <a:p>
+                      <a:pPr algn="ctr" fontAlgn="b"/>
+                      <a:r>
+                        <a:rPr lang="de-DE" sz="1900" b="0" i="0" u="none" strike="noStrike">
+                          <a:solidFill>
+                            <a:srgbClr val="333333"/>
+                          </a:solidFill>
+                          <a:effectLst/>
+                          <a:latin typeface="+mn-lt"/>
+                        </a:rPr>
+                        <a:t>“</a:t>
+                      </a:r>
+                    </a:p>
+                  </a:txBody>
+                  <a:tcPr marL="16933" marR="16933" marT="16933" marB="0" anchor="b"/>
+                </a:tc>
+                <a:extLst>
+                  <a:ext uri="{0D108BD9-81ED-4DB2-BD59-A6C34878D82A}">
+                    <a16:rowId xmlns:a16="http://schemas.microsoft.com/office/drawing/2014/main" val="10002"/>
+                  </a:ext>
+                </a:extLst>
+              </a:tr>
+              <a:tr h="392137">
+                <a:tc>
+                  <a:txBody>
+                    <a:bodyPr/>
+                    <a:lstStyle/>
+                    <a:p>
+                      <a:pPr algn="ctr" fontAlgn="b"/>
+                      <a:r>
+                        <a:rPr lang="is-IS" sz="1900" b="0" i="0" u="none" strike="noStrike" dirty="0">
+                          <a:solidFill>
+                            <a:srgbClr val="333333"/>
+                          </a:solidFill>
+                          <a:effectLst/>
+                          <a:latin typeface="+mn-lt"/>
+                        </a:rPr>
+                        <a:t>2</a:t>
+                      </a:r>
+                    </a:p>
+                  </a:txBody>
+                  <a:tcPr marL="16933" marR="16933" marT="16933" marB="0" anchor="b"/>
+                </a:tc>
+                <a:tc>
+                  <a:txBody>
+                    <a:bodyPr/>
+                    <a:lstStyle/>
+                    <a:p>
+                      <a:pPr algn="ctr" fontAlgn="b"/>
+                      <a:r>
+                        <a:rPr lang="is-IS" sz="1900" b="0" i="0" u="none" strike="noStrike" dirty="0">
+                          <a:solidFill>
+                            <a:srgbClr val="333333"/>
+                          </a:solidFill>
+                          <a:effectLst/>
+                          <a:latin typeface="+mn-lt"/>
+                        </a:rPr>
+                        <a:t>0.631</a:t>
+                      </a:r>
+                    </a:p>
+                  </a:txBody>
+                  <a:tcPr marL="16933" marR="16933" marT="16933" marB="0" anchor="b"/>
+                </a:tc>
+                <a:tc>
+                  <a:txBody>
+                    <a:bodyPr/>
+                    <a:lstStyle/>
+                    <a:p>
+                      <a:pPr algn="ctr" fontAlgn="b"/>
+                      <a:r>
+                        <a:rPr lang="en-US" sz="1900" b="0" i="0" u="none" strike="noStrike" dirty="0">
+                          <a:solidFill>
+                            <a:srgbClr val="333333"/>
+                          </a:solidFill>
+                          <a:effectLst/>
+                          <a:latin typeface="+mn-lt"/>
+                        </a:rPr>
+                        <a:t>0.369</a:t>
+                      </a:r>
+                    </a:p>
+                  </a:txBody>
+                  <a:tcPr marL="16933" marR="16933" marT="16933" marB="0" anchor="b"/>
+                </a:tc>
+                <a:tc>
+                  <a:txBody>
+                    <a:bodyPr/>
+                    <a:lstStyle/>
+                    <a:p>
+                      <a:pPr algn="ctr" fontAlgn="b"/>
+                      <a:r>
+                        <a:rPr lang="en-US" sz="1900" b="0" i="0" u="none" strike="noStrike" dirty="0">
+                          <a:solidFill>
+                            <a:srgbClr val="333333"/>
+                          </a:solidFill>
+                          <a:effectLst/>
+                          <a:latin typeface="+mn-lt"/>
+                        </a:rPr>
+                        <a:t>35</a:t>
+                      </a:r>
+                    </a:p>
+                  </a:txBody>
+                  <a:tcPr marL="16933" marR="16933" marT="16933" marB="0" anchor="b"/>
+                </a:tc>
+                <a:tc>
+                  <a:txBody>
+                    <a:bodyPr/>
+                    <a:lstStyle/>
+                    <a:p>
+                      <a:pPr algn="ctr" fontAlgn="b"/>
+                      <a:r>
+                        <a:rPr lang="uk-UA" sz="1900" b="0" i="0" u="none" strike="noStrike" dirty="0">
+                          <a:solidFill>
+                            <a:srgbClr val="333333"/>
+                          </a:solidFill>
+                          <a:effectLst/>
+                          <a:latin typeface="+mn-lt"/>
+                        </a:rPr>
+                        <a:t>#</a:t>
+                      </a:r>
+                    </a:p>
+                  </a:txBody>
+                  <a:tcPr marL="16933" marR="16933" marT="16933" marB="0" anchor="b"/>
+                </a:tc>
+                <a:extLst>
+                  <a:ext uri="{0D108BD9-81ED-4DB2-BD59-A6C34878D82A}">
+                    <a16:rowId xmlns:a16="http://schemas.microsoft.com/office/drawing/2014/main" val="10003"/>
+                  </a:ext>
+                </a:extLst>
+              </a:tr>
+              <a:tr h="392137">
+                <a:tc>
+                  <a:txBody>
+                    <a:bodyPr/>
+                    <a:lstStyle/>
+                    <a:p>
+                      <a:pPr algn="ctr" fontAlgn="b"/>
+                      <a:r>
+                        <a:rPr lang="en-US" sz="1900" b="0" i="0" u="none" strike="noStrike" dirty="0">
+                          <a:solidFill>
+                            <a:srgbClr val="333333"/>
+                          </a:solidFill>
+                          <a:effectLst/>
+                          <a:latin typeface="+mn-lt"/>
+                        </a:rPr>
+                        <a:t>10</a:t>
+                      </a:r>
+                    </a:p>
+                  </a:txBody>
+                  <a:tcPr marL="16933" marR="16933" marT="16933" marB="0" anchor="b"/>
+                </a:tc>
+                <a:tc>
+                  <a:txBody>
+                    <a:bodyPr/>
+                    <a:lstStyle/>
+                    <a:p>
+                      <a:pPr algn="ctr" fontAlgn="b"/>
+                      <a:r>
+                        <a:rPr lang="nb-NO" sz="1900" b="0" i="0" u="none" strike="noStrike" dirty="0">
+                          <a:solidFill>
+                            <a:srgbClr val="333333"/>
+                          </a:solidFill>
+                          <a:effectLst/>
+                          <a:latin typeface="+mn-lt"/>
+                        </a:rPr>
+                        <a:t>0.1</a:t>
+                      </a:r>
+                    </a:p>
+                  </a:txBody>
+                  <a:tcPr marL="16933" marR="16933" marT="16933" marB="0" anchor="b"/>
+                </a:tc>
+                <a:tc>
+                  <a:txBody>
+                    <a:bodyPr/>
+                    <a:lstStyle/>
+                    <a:p>
+                      <a:pPr algn="ctr"/>
+                      <a:r>
+                        <a:rPr lang="en-US" sz="1900" dirty="0">
+                          <a:latin typeface="+mn-lt"/>
+                        </a:rPr>
+                        <a:t>0.90</a:t>
+                      </a:r>
+                    </a:p>
+                  </a:txBody>
+                  <a:tcPr marL="16933" marR="16933" marT="16933" marB="0" anchor="b"/>
+                </a:tc>
+                <a:tc>
+                  <a:txBody>
+                    <a:bodyPr/>
+                    <a:lstStyle/>
+                    <a:p>
+                      <a:pPr algn="ctr" fontAlgn="b"/>
+                      <a:r>
+                        <a:rPr lang="en-US" sz="1900" b="0" i="0" u="none" strike="noStrike" dirty="0">
+                          <a:solidFill>
+                            <a:srgbClr val="333333"/>
+                          </a:solidFill>
+                          <a:effectLst/>
+                          <a:latin typeface="+mn-lt"/>
+                        </a:rPr>
+                        <a:t>43</a:t>
+                      </a:r>
+                    </a:p>
+                  </a:txBody>
+                  <a:tcPr marL="16933" marR="16933" marT="16933" marB="0" anchor="b"/>
+                </a:tc>
+                <a:tc>
+                  <a:txBody>
+                    <a:bodyPr/>
+                    <a:lstStyle/>
+                    <a:p>
+                      <a:pPr algn="ctr" fontAlgn="b"/>
+                      <a:r>
+                        <a:rPr lang="en-US" sz="1900" b="0" i="0" u="none" strike="noStrike" dirty="0">
+                          <a:solidFill>
+                            <a:srgbClr val="333333"/>
+                          </a:solidFill>
+                          <a:effectLst/>
+                          <a:latin typeface="+mn-lt"/>
+                        </a:rPr>
+                        <a:t>+</a:t>
+                      </a:r>
+                    </a:p>
+                  </a:txBody>
+                  <a:tcPr marL="16933" marR="16933" marT="16933" marB="0" anchor="b"/>
+                </a:tc>
+                <a:extLst>
+                  <a:ext uri="{0D108BD9-81ED-4DB2-BD59-A6C34878D82A}">
+                    <a16:rowId xmlns:a16="http://schemas.microsoft.com/office/drawing/2014/main" val="10004"/>
+                  </a:ext>
+                </a:extLst>
+              </a:tr>
+              <a:tr h="392137">
+                <a:tc>
+                  <a:txBody>
+                    <a:bodyPr/>
+                    <a:lstStyle/>
+                    <a:p>
+                      <a:pPr algn="ctr" fontAlgn="b"/>
+                      <a:r>
+                        <a:rPr lang="is-IS" sz="1900" b="0" i="0" u="none" strike="noStrike" dirty="0">
+                          <a:solidFill>
+                            <a:srgbClr val="333333"/>
+                          </a:solidFill>
+                          <a:effectLst/>
+                          <a:latin typeface="+mn-lt"/>
+                        </a:rPr>
+                        <a:t>20</a:t>
+                      </a:r>
+                    </a:p>
+                  </a:txBody>
+                  <a:tcPr marL="16933" marR="16933" marT="16933" marB="0" anchor="b"/>
+                </a:tc>
+                <a:tc>
+                  <a:txBody>
+                    <a:bodyPr/>
+                    <a:lstStyle/>
+                    <a:p>
+                      <a:pPr algn="ctr" fontAlgn="b"/>
+                      <a:r>
+                        <a:rPr lang="nb-NO" sz="1900" b="0" i="0" u="none" strike="noStrike" dirty="0">
+                          <a:solidFill>
+                            <a:srgbClr val="333333"/>
+                          </a:solidFill>
+                          <a:effectLst/>
+                          <a:latin typeface="+mn-lt"/>
+                        </a:rPr>
+                        <a:t>0.01</a:t>
+                      </a:r>
+                    </a:p>
+                  </a:txBody>
+                  <a:tcPr marL="16933" marR="16933" marT="16933" marB="0" anchor="b"/>
+                </a:tc>
+                <a:tc>
+                  <a:txBody>
+                    <a:bodyPr/>
+                    <a:lstStyle/>
+                    <a:p>
+                      <a:pPr algn="ctr"/>
+                      <a:r>
+                        <a:rPr lang="en-US" sz="1900" dirty="0">
+                          <a:latin typeface="+mn-lt"/>
+                        </a:rPr>
+                        <a:t>0.99</a:t>
+                      </a:r>
+                    </a:p>
+                  </a:txBody>
+                  <a:tcPr marL="16933" marR="16933" marT="16933" marB="0" anchor="b"/>
+                </a:tc>
+                <a:tc>
+                  <a:txBody>
+                    <a:bodyPr/>
+                    <a:lstStyle/>
+                    <a:p>
+                      <a:pPr algn="ctr" fontAlgn="b"/>
+                      <a:r>
+                        <a:rPr lang="en-US" sz="1900" b="0" i="0" u="none" strike="noStrike" dirty="0">
+                          <a:solidFill>
+                            <a:srgbClr val="333333"/>
+                          </a:solidFill>
+                          <a:effectLst/>
+                          <a:latin typeface="+mn-lt"/>
+                        </a:rPr>
+                        <a:t>53</a:t>
+                      </a:r>
+                    </a:p>
+                  </a:txBody>
+                  <a:tcPr marL="16933" marR="16933" marT="16933" marB="0" anchor="b"/>
+                </a:tc>
+                <a:tc>
+                  <a:txBody>
+                    <a:bodyPr/>
+                    <a:lstStyle/>
+                    <a:p>
+                      <a:pPr algn="ctr" fontAlgn="b"/>
+                      <a:r>
+                        <a:rPr lang="en-US" sz="1900" b="0" i="0" u="none" strike="noStrike" dirty="0">
+                          <a:solidFill>
+                            <a:srgbClr val="333333"/>
+                          </a:solidFill>
+                          <a:effectLst/>
+                          <a:latin typeface="+mn-lt"/>
+                        </a:rPr>
+                        <a:t>5</a:t>
+                      </a:r>
+                    </a:p>
+                  </a:txBody>
+                  <a:tcPr marL="16933" marR="16933" marT="16933" marB="0" anchor="b"/>
+                </a:tc>
+                <a:extLst>
+                  <a:ext uri="{0D108BD9-81ED-4DB2-BD59-A6C34878D82A}">
+                    <a16:rowId xmlns:a16="http://schemas.microsoft.com/office/drawing/2014/main" val="10005"/>
+                  </a:ext>
+                </a:extLst>
+              </a:tr>
+              <a:tr h="392137">
+                <a:tc>
+                  <a:txBody>
+                    <a:bodyPr/>
+                    <a:lstStyle/>
+                    <a:p>
+                      <a:pPr algn="ctr" fontAlgn="b"/>
+                      <a:r>
+                        <a:rPr lang="en-US" sz="1900" b="0" i="0" u="none" strike="noStrike" dirty="0">
+                          <a:solidFill>
+                            <a:srgbClr val="333333"/>
+                          </a:solidFill>
+                          <a:effectLst/>
+                          <a:latin typeface="+mn-lt"/>
+                        </a:rPr>
+                        <a:t>30</a:t>
+                      </a:r>
+                    </a:p>
+                  </a:txBody>
+                  <a:tcPr marL="16933" marR="16933" marT="16933" marB="0" anchor="b"/>
+                </a:tc>
+                <a:tc>
+                  <a:txBody>
+                    <a:bodyPr/>
+                    <a:lstStyle/>
+                    <a:p>
+                      <a:pPr algn="ctr" fontAlgn="b"/>
+                      <a:r>
+                        <a:rPr lang="nb-NO" sz="1900" b="0" i="0" u="none" strike="noStrike">
+                          <a:solidFill>
+                            <a:srgbClr val="333333"/>
+                          </a:solidFill>
+                          <a:effectLst/>
+                          <a:latin typeface="+mn-lt"/>
+                        </a:rPr>
+                        <a:t>0.001</a:t>
+                      </a:r>
+                    </a:p>
+                  </a:txBody>
+                  <a:tcPr marL="16933" marR="16933" marT="16933" marB="0" anchor="b"/>
+                </a:tc>
+                <a:tc>
+                  <a:txBody>
+                    <a:bodyPr/>
+                    <a:lstStyle/>
+                    <a:p>
+                      <a:pPr algn="ctr"/>
+                      <a:r>
+                        <a:rPr lang="en-US" sz="1900" dirty="0">
+                          <a:latin typeface="+mn-lt"/>
+                        </a:rPr>
+                        <a:t>0.999</a:t>
+                      </a:r>
+                    </a:p>
+                  </a:txBody>
+                  <a:tcPr marL="16933" marR="16933" marT="16933" marB="0" anchor="b"/>
+                </a:tc>
+                <a:tc>
+                  <a:txBody>
+                    <a:bodyPr/>
+                    <a:lstStyle/>
+                    <a:p>
+                      <a:pPr algn="ctr" fontAlgn="b"/>
+                      <a:r>
+                        <a:rPr lang="is-IS" sz="1900" b="0" i="0" u="none" strike="noStrike" dirty="0">
+                          <a:solidFill>
+                            <a:srgbClr val="333333"/>
+                          </a:solidFill>
+                          <a:effectLst/>
+                          <a:latin typeface="+mn-lt"/>
+                        </a:rPr>
+                        <a:t>63</a:t>
+                      </a:r>
+                    </a:p>
+                  </a:txBody>
+                  <a:tcPr marL="16933" marR="16933" marT="16933" marB="0" anchor="b"/>
+                </a:tc>
+                <a:tc>
+                  <a:txBody>
+                    <a:bodyPr/>
+                    <a:lstStyle/>
+                    <a:p>
+                      <a:pPr algn="ctr" fontAlgn="b"/>
+                      <a:r>
+                        <a:rPr lang="ru-RU" sz="1900" b="0" i="0" u="none" strike="noStrike" dirty="0">
+                          <a:solidFill>
+                            <a:srgbClr val="333333"/>
+                          </a:solidFill>
+                          <a:effectLst/>
+                          <a:latin typeface="+mn-lt"/>
+                        </a:rPr>
+                        <a:t>?</a:t>
+                      </a:r>
+                    </a:p>
+                  </a:txBody>
+                  <a:tcPr marL="16933" marR="16933" marT="16933" marB="0" anchor="b"/>
+                </a:tc>
+                <a:extLst>
+                  <a:ext uri="{0D108BD9-81ED-4DB2-BD59-A6C34878D82A}">
+                    <a16:rowId xmlns:a16="http://schemas.microsoft.com/office/drawing/2014/main" val="10006"/>
+                  </a:ext>
+                </a:extLst>
+              </a:tr>
+            </a:tbl>
+          </a:graphicData>
+        </a:graphic>
+      </p:graphicFrame>
+      <p:sp>
+        <p:nvSpPr>
+          <p:cNvPr id="9" name="Content Placeholder 2"/>
+          <p:cNvSpPr>
+            <a:spLocks noGrp="1"/>
+          </p:cNvSpPr>
+          <p:nvPr>
+            <p:ph idx="1"/>
+          </p:nvPr>
+        </p:nvSpPr>
+        <p:spPr>
+          <a:xfrm>
+            <a:off x="1639614" y="4143705"/>
+            <a:ext cx="8055427" cy="2336800"/>
+          </a:xfrm>
+        </p:spPr>
+        <p:txBody>
+          <a:bodyPr>
+            <a:normAutofit fontScale="70000" lnSpcReduction="20000"/>
+          </a:bodyPr>
+          <a:lstStyle/>
+          <a:p>
+            <a:pPr marL="0" indent="0">
+              <a:buNone/>
+              <a:defRPr/>
+            </a:pPr>
+            <a:r>
+              <a:rPr lang="en-US" dirty="0">
+                <a:latin typeface="Calibri" panose="020F0502020204030204" pitchFamily="34" charset="0"/>
+                <a:ea typeface="ＭＳ Ｐゴシック" charset="0"/>
+                <a:cs typeface="Calibri" panose="020F0502020204030204" pitchFamily="34" charset="0"/>
+              </a:rPr>
+              <a:t>Encoding History:</a:t>
+            </a:r>
+          </a:p>
+          <a:p>
+            <a:pPr>
+              <a:defRPr/>
+            </a:pPr>
+            <a:r>
+              <a:rPr lang="en-US" dirty="0">
+                <a:latin typeface="Calibri" panose="020F0502020204030204" pitchFamily="34" charset="0"/>
+                <a:ea typeface="ＭＳ Ｐゴシック" charset="0"/>
+                <a:cs typeface="Calibri" panose="020F0502020204030204" pitchFamily="34" charset="0"/>
+              </a:rPr>
+              <a:t>Sanger Format (shown above): Q of 0 to 93 using ASCII 33 to 126</a:t>
+            </a:r>
+          </a:p>
+          <a:p>
+            <a:pPr lvl="1">
+              <a:defRPr/>
+            </a:pPr>
+            <a:r>
+              <a:rPr lang="en-US" dirty="0">
+                <a:latin typeface="Calibri" panose="020F0502020204030204" pitchFamily="34" charset="0"/>
+                <a:ea typeface="ＭＳ Ｐゴシック" charset="0"/>
+                <a:cs typeface="Calibri" panose="020F0502020204030204" pitchFamily="34" charset="0"/>
+              </a:rPr>
+              <a:t>Sanger data, SAM format, </a:t>
+            </a:r>
+            <a:r>
+              <a:rPr lang="en-US" dirty="0" err="1">
+                <a:latin typeface="Calibri" panose="020F0502020204030204" pitchFamily="34" charset="0"/>
+                <a:ea typeface="ＭＳ Ｐゴシック" charset="0"/>
+                <a:cs typeface="Calibri" panose="020F0502020204030204" pitchFamily="34" charset="0"/>
+              </a:rPr>
+              <a:t>Illumina</a:t>
+            </a:r>
+            <a:r>
+              <a:rPr lang="en-US" dirty="0">
+                <a:latin typeface="Calibri" panose="020F0502020204030204" pitchFamily="34" charset="0"/>
+                <a:ea typeface="ＭＳ Ｐゴシック" charset="0"/>
+                <a:cs typeface="Calibri" panose="020F0502020204030204" pitchFamily="34" charset="0"/>
+              </a:rPr>
+              <a:t> 1.8+</a:t>
+            </a:r>
+          </a:p>
+          <a:p>
+            <a:pPr>
+              <a:defRPr/>
+            </a:pPr>
+            <a:r>
+              <a:rPr lang="en-US" dirty="0" err="1">
+                <a:latin typeface="Calibri" panose="020F0502020204030204" pitchFamily="34" charset="0"/>
+                <a:ea typeface="ＭＳ Ｐゴシック" charset="0"/>
+                <a:cs typeface="Calibri" panose="020F0502020204030204" pitchFamily="34" charset="0"/>
+              </a:rPr>
+              <a:t>Solexa</a:t>
+            </a:r>
+            <a:r>
+              <a:rPr lang="en-US" dirty="0">
+                <a:latin typeface="Calibri" panose="020F0502020204030204" pitchFamily="34" charset="0"/>
+                <a:ea typeface="ＭＳ Ｐゴシック" charset="0"/>
+                <a:cs typeface="Calibri" panose="020F0502020204030204" pitchFamily="34" charset="0"/>
+              </a:rPr>
+              <a:t>/</a:t>
+            </a:r>
+            <a:r>
+              <a:rPr lang="en-US" dirty="0" err="1">
+                <a:latin typeface="Calibri" panose="020F0502020204030204" pitchFamily="34" charset="0"/>
+                <a:ea typeface="ＭＳ Ｐゴシック" charset="0"/>
+                <a:cs typeface="Calibri" panose="020F0502020204030204" pitchFamily="34" charset="0"/>
+              </a:rPr>
+              <a:t>Illumina</a:t>
+            </a:r>
+            <a:r>
+              <a:rPr lang="en-US" dirty="0">
+                <a:latin typeface="Calibri" panose="020F0502020204030204" pitchFamily="34" charset="0"/>
+                <a:ea typeface="ＭＳ Ｐゴシック" charset="0"/>
+                <a:cs typeface="Calibri" panose="020F0502020204030204" pitchFamily="34" charset="0"/>
+              </a:rPr>
+              <a:t> 1.0: Q of -5 to 62 using ASCII 59 to 126</a:t>
+            </a:r>
+          </a:p>
+          <a:p>
+            <a:pPr>
+              <a:defRPr/>
+            </a:pPr>
+            <a:r>
+              <a:rPr lang="en-US" dirty="0" err="1">
+                <a:latin typeface="Calibri" panose="020F0502020204030204" pitchFamily="34" charset="0"/>
+                <a:ea typeface="ＭＳ Ｐゴシック" charset="0"/>
+                <a:cs typeface="Calibri" panose="020F0502020204030204" pitchFamily="34" charset="0"/>
+              </a:rPr>
+              <a:t>Illumina</a:t>
+            </a:r>
+            <a:r>
+              <a:rPr lang="en-US" dirty="0">
+                <a:latin typeface="Calibri" panose="020F0502020204030204" pitchFamily="34" charset="0"/>
+                <a:ea typeface="ＭＳ Ｐゴシック" charset="0"/>
+                <a:cs typeface="Calibri" panose="020F0502020204030204" pitchFamily="34" charset="0"/>
+              </a:rPr>
+              <a:t> 1.3 to 1.8: Q of 0 to 62 using ASCII 64 to 126</a:t>
+            </a:r>
+          </a:p>
+          <a:p>
+            <a:pPr>
+              <a:defRPr/>
+            </a:pPr>
+            <a:r>
+              <a:rPr lang="en-US" dirty="0">
+                <a:latin typeface="Calibri" panose="020F0502020204030204" pitchFamily="34" charset="0"/>
+                <a:ea typeface="ＭＳ Ｐゴシック" charset="0"/>
+                <a:cs typeface="Calibri" panose="020F0502020204030204" pitchFamily="34" charset="0"/>
+              </a:rPr>
+              <a:t>Illumina 1.5 to 1.7: </a:t>
+            </a:r>
+            <a:r>
+              <a:rPr lang="en-US" dirty="0" err="1">
+                <a:latin typeface="Calibri" panose="020F0502020204030204" pitchFamily="34" charset="0"/>
+                <a:ea typeface="ＭＳ Ｐゴシック" charset="0"/>
+                <a:cs typeface="Calibri" panose="020F0502020204030204" pitchFamily="34" charset="0"/>
+              </a:rPr>
+              <a:t>Phred</a:t>
+            </a:r>
+            <a:r>
+              <a:rPr lang="en-US" dirty="0">
+                <a:latin typeface="Calibri" panose="020F0502020204030204" pitchFamily="34" charset="0"/>
+                <a:ea typeface="ＭＳ Ｐゴシック" charset="0"/>
+                <a:cs typeface="Calibri" panose="020F0502020204030204" pitchFamily="34" charset="0"/>
+              </a:rPr>
+              <a:t> scores 0 to 2 have a slightly different meaning</a:t>
+            </a:r>
+          </a:p>
+          <a:p>
+            <a:pPr>
+              <a:defRPr/>
+            </a:pPr>
+            <a:r>
+              <a:rPr lang="en-US" dirty="0">
+                <a:latin typeface="Calibri" panose="020F0502020204030204" pitchFamily="34" charset="0"/>
+                <a:ea typeface="ＭＳ Ｐゴシック" charset="0"/>
+                <a:cs typeface="Calibri" panose="020F0502020204030204" pitchFamily="34" charset="0"/>
+              </a:rPr>
+              <a:t>Illumina 1.8+ -&gt; Sanger Format</a:t>
+            </a:r>
+          </a:p>
+        </p:txBody>
+      </p:sp>
+    </p:spTree>
+    <p:extLst>
+      <p:ext uri="{BB962C8B-B14F-4D97-AF65-F5344CB8AC3E}">
+        <p14:creationId xmlns:p14="http://schemas.microsoft.com/office/powerpoint/2010/main" val="3957395573"/>
       </p:ext>
     </p:extLst>
   </p:cSld>

</xml_diff>